<commit_message>
[Doc] Update input folder content Fixes #281
</commit_message>
<xml_diff>
--- a/spec/input/sketch offered notifications.pptx
+++ b/spec/input/sketch offered notifications.pptx
@@ -8,6 +8,8 @@
     <p:sldId id="256" r:id="rId2"/>
     <p:sldId id="257" r:id="rId3"/>
     <p:sldId id="258" r:id="rId4"/>
+    <p:sldId id="259" r:id="rId5"/>
+    <p:sldId id="260" r:id="rId6"/>
   </p:sldIdLst>
   <p:sldSz cx="12192000" cy="6858000"/>
   <p:notesSz cx="6858000" cy="9144000"/>
@@ -106,6 +108,11 @@
       </a:defRPr>
     </a:lvl9pPr>
   </p:defaultTextStyle>
+  <p:extLst>
+    <p:ext uri="{EFAFB233-063F-42B5-8137-9DF3F51BA10A}">
+      <p15:sldGuideLst xmlns:p15="http://schemas.microsoft.com/office/powerpoint/2012/main"/>
+    </p:ext>
+  </p:extLst>
 </p:presentation>
 </file>
 
@@ -256,7 +263,7 @@
           <a:p>
             <a:fld id="{31AB3599-4C0D-4E00-838F-CBE73BA9A4A9}" type="datetimeFigureOut">
               <a:rPr lang="de-DE" smtClean="0"/>
-              <a:t>12.07.2023</a:t>
+              <a:t>13.07.2023</a:t>
             </a:fld>
             <a:endParaRPr lang="de-DE"/>
           </a:p>
@@ -454,7 +461,7 @@
           <a:p>
             <a:fld id="{31AB3599-4C0D-4E00-838F-CBE73BA9A4A9}" type="datetimeFigureOut">
               <a:rPr lang="de-DE" smtClean="0"/>
-              <a:t>12.07.2023</a:t>
+              <a:t>13.07.2023</a:t>
             </a:fld>
             <a:endParaRPr lang="de-DE"/>
           </a:p>
@@ -662,7 +669,7 @@
           <a:p>
             <a:fld id="{31AB3599-4C0D-4E00-838F-CBE73BA9A4A9}" type="datetimeFigureOut">
               <a:rPr lang="de-DE" smtClean="0"/>
-              <a:t>12.07.2023</a:t>
+              <a:t>13.07.2023</a:t>
             </a:fld>
             <a:endParaRPr lang="de-DE"/>
           </a:p>
@@ -860,7 +867,7 @@
           <a:p>
             <a:fld id="{31AB3599-4C0D-4E00-838F-CBE73BA9A4A9}" type="datetimeFigureOut">
               <a:rPr lang="de-DE" smtClean="0"/>
-              <a:t>12.07.2023</a:t>
+              <a:t>13.07.2023</a:t>
             </a:fld>
             <a:endParaRPr lang="de-DE"/>
           </a:p>
@@ -1135,7 +1142,7 @@
           <a:p>
             <a:fld id="{31AB3599-4C0D-4E00-838F-CBE73BA9A4A9}" type="datetimeFigureOut">
               <a:rPr lang="de-DE" smtClean="0"/>
-              <a:t>12.07.2023</a:t>
+              <a:t>13.07.2023</a:t>
             </a:fld>
             <a:endParaRPr lang="de-DE"/>
           </a:p>
@@ -1400,7 +1407,7 @@
           <a:p>
             <a:fld id="{31AB3599-4C0D-4E00-838F-CBE73BA9A4A9}" type="datetimeFigureOut">
               <a:rPr lang="de-DE" smtClean="0"/>
-              <a:t>12.07.2023</a:t>
+              <a:t>13.07.2023</a:t>
             </a:fld>
             <a:endParaRPr lang="de-DE"/>
           </a:p>
@@ -1812,7 +1819,7 @@
           <a:p>
             <a:fld id="{31AB3599-4C0D-4E00-838F-CBE73BA9A4A9}" type="datetimeFigureOut">
               <a:rPr lang="de-DE" smtClean="0"/>
-              <a:t>12.07.2023</a:t>
+              <a:t>13.07.2023</a:t>
             </a:fld>
             <a:endParaRPr lang="de-DE"/>
           </a:p>
@@ -1953,7 +1960,7 @@
           <a:p>
             <a:fld id="{31AB3599-4C0D-4E00-838F-CBE73BA9A4A9}" type="datetimeFigureOut">
               <a:rPr lang="de-DE" smtClean="0"/>
-              <a:t>12.07.2023</a:t>
+              <a:t>13.07.2023</a:t>
             </a:fld>
             <a:endParaRPr lang="de-DE"/>
           </a:p>
@@ -2066,7 +2073,7 @@
           <a:p>
             <a:fld id="{31AB3599-4C0D-4E00-838F-CBE73BA9A4A9}" type="datetimeFigureOut">
               <a:rPr lang="de-DE" smtClean="0"/>
-              <a:t>12.07.2023</a:t>
+              <a:t>13.07.2023</a:t>
             </a:fld>
             <a:endParaRPr lang="de-DE"/>
           </a:p>
@@ -2377,7 +2384,7 @@
           <a:p>
             <a:fld id="{31AB3599-4C0D-4E00-838F-CBE73BA9A4A9}" type="datetimeFigureOut">
               <a:rPr lang="de-DE" smtClean="0"/>
-              <a:t>12.07.2023</a:t>
+              <a:t>13.07.2023</a:t>
             </a:fld>
             <a:endParaRPr lang="de-DE"/>
           </a:p>
@@ -2665,7 +2672,7 @@
           <a:p>
             <a:fld id="{31AB3599-4C0D-4E00-838F-CBE73BA9A4A9}" type="datetimeFigureOut">
               <a:rPr lang="de-DE" smtClean="0"/>
-              <a:t>12.07.2023</a:t>
+              <a:t>13.07.2023</a:t>
             </a:fld>
             <a:endParaRPr lang="de-DE"/>
           </a:p>
@@ -2906,7 +2913,7 @@
           <a:p>
             <a:fld id="{31AB3599-4C0D-4E00-838F-CBE73BA9A4A9}" type="datetimeFigureOut">
               <a:rPr lang="de-DE" smtClean="0"/>
-              <a:t>12.07.2023</a:t>
+              <a:t>13.07.2023</a:t>
             </a:fld>
             <a:endParaRPr lang="de-DE"/>
           </a:p>
@@ -3496,6 +3503,42 @@
           </a:p>
         </p:txBody>
       </p:sp>
+      <p:sp>
+        <p:nvSpPr>
+          <p:cNvPr id="2" name="Textfeld 1">
+            <a:extLst>
+              <a:ext uri="{FF2B5EF4-FFF2-40B4-BE49-F238E27FC236}">
+                <a16:creationId xmlns:a16="http://schemas.microsoft.com/office/drawing/2014/main" id="{578DB4BD-FCE9-C73D-6712-F6275EC7EC4F}"/>
+              </a:ext>
+            </a:extLst>
+          </p:cNvPr>
+          <p:cNvSpPr txBox="1"/>
+          <p:nvPr/>
+        </p:nvSpPr>
+        <p:spPr>
+          <a:xfrm>
+            <a:off x="3726426" y="1024965"/>
+            <a:ext cx="1894621" cy="369332"/>
+          </a:xfrm>
+          <a:prstGeom prst="rect">
+            <a:avLst/>
+          </a:prstGeom>
+          <a:noFill/>
+        </p:spPr>
+        <p:txBody>
+          <a:bodyPr wrap="none" rtlCol="0">
+            <a:spAutoFit/>
+          </a:bodyPr>
+          <a:lstStyle/>
+          <a:p>
+            <a:r>
+              <a:rPr lang="de-DE"/>
+              <a:t>objectIdReference</a:t>
+            </a:r>
+            <a:endParaRPr lang="de-DE" dirty="0"/>
+          </a:p>
+        </p:txBody>
+      </p:sp>
     </p:spTree>
     <p:extLst>
       <p:ext uri="{BB962C8B-B14F-4D97-AF65-F5344CB8AC3E}">
@@ -3678,8 +3721,8 @@
         </p:nvSpPr>
         <p:spPr>
           <a:xfrm>
-            <a:off x="236014" y="302652"/>
-            <a:ext cx="731290" cy="369332"/>
+            <a:off x="146367" y="0"/>
+            <a:ext cx="3723840" cy="369332"/>
           </a:xfrm>
           <a:prstGeom prst="rect">
             <a:avLst/>
@@ -3693,9 +3736,10 @@
           <a:lstStyle/>
           <a:p>
             <a:r>
-              <a:rPr lang="de-DE" dirty="0"/>
-              <a:t>MNDI</a:t>
-            </a:r>
+              <a:rPr lang="de-DE"/>
+              <a:t>MicroWaveNetworkInventory (MWNI)</a:t>
+            </a:r>
+            <a:endParaRPr lang="de-DE" dirty="0"/>
           </a:p>
         </p:txBody>
       </p:sp>
@@ -4139,6 +4183,11 @@
             <a:avLst/>
           </a:prstGeom>
           <a:ln>
+            <a:solidFill>
+              <a:schemeClr val="accent2">
+                <a:lumMod val="75000"/>
+              </a:schemeClr>
+            </a:solidFill>
             <a:tailEnd type="triangle"/>
           </a:ln>
         </p:spPr>
@@ -4391,7 +4440,7 @@
         <p:spPr>
           <a:xfrm>
             <a:off x="7987447" y="2420465"/>
-            <a:ext cx="3475685" cy="369332"/>
+            <a:ext cx="3475685" cy="646331"/>
           </a:xfrm>
           <a:prstGeom prst="rect">
             <a:avLst/>
@@ -4404,15 +4453,211 @@
           </a:bodyPr>
           <a:lstStyle/>
           <a:p>
+            <a:pPr marL="285750" indent="-285750">
+              <a:buFont typeface="Symbol" panose="05050102010706020507" pitchFamily="18" charset="2"/>
+              <a:buChar char="Þ"/>
+            </a:pPr>
+            <a:r>
+              <a:rPr lang="de-DE"/>
+              <a:t>/</a:t>
+            </a:r>
             <a:r>
               <a:rPr lang="de-DE" dirty="0"/>
-              <a:t>=&gt; /v1/</a:t>
-            </a:r>
-            <a:r>
-              <a:rPr lang="de-DE" dirty="0" err="1"/>
-              <a:t>regard-object-creation</a:t>
-            </a:r>
-            <a:endParaRPr lang="de-DE" dirty="0"/>
+              <a:t>v1</a:t>
+            </a:r>
+            <a:r>
+              <a:rPr lang="de-DE"/>
+              <a:t>/regard-object-creation</a:t>
+            </a:r>
+          </a:p>
+          <a:p>
+            <a:r>
+              <a:rPr lang="de-DE"/>
+              <a:t>      </a:t>
+            </a:r>
+            <a:r>
+              <a:rPr lang="de-DE" sz="1100" i="1"/>
+              <a:t>(answer to)</a:t>
+            </a:r>
+            <a:endParaRPr lang="de-DE" i="1" dirty="0"/>
+          </a:p>
+        </p:txBody>
+      </p:sp>
+      <p:sp>
+        <p:nvSpPr>
+          <p:cNvPr id="2" name="Textfeld 1">
+            <a:extLst>
+              <a:ext uri="{FF2B5EF4-FFF2-40B4-BE49-F238E27FC236}">
+                <a16:creationId xmlns:a16="http://schemas.microsoft.com/office/drawing/2014/main" id="{3C7EF258-068B-87C6-D028-3143EA2A4C3E}"/>
+              </a:ext>
+            </a:extLst>
+          </p:cNvPr>
+          <p:cNvSpPr txBox="1"/>
+          <p:nvPr/>
+        </p:nvSpPr>
+        <p:spPr>
+          <a:xfrm>
+            <a:off x="7894736" y="1469771"/>
+            <a:ext cx="2645276" cy="415498"/>
+          </a:xfrm>
+          <a:prstGeom prst="rect">
+            <a:avLst/>
+          </a:prstGeom>
+          <a:noFill/>
+        </p:spPr>
+        <p:txBody>
+          <a:bodyPr wrap="none" rtlCol="0">
+            <a:spAutoFit/>
+          </a:bodyPr>
+          <a:lstStyle/>
+          <a:p>
+            <a:r>
+              <a:rPr lang="de-DE" sz="1100"/>
+              <a:t>_objIdRef = CC-uuid + mount-name  </a:t>
+            </a:r>
+          </a:p>
+          <a:p>
+            <a:r>
+              <a:rPr lang="de-DE" sz="1000" i="1"/>
+              <a:t>                        (without mount-name not unique)</a:t>
+            </a:r>
+          </a:p>
+        </p:txBody>
+      </p:sp>
+      <p:sp>
+        <p:nvSpPr>
+          <p:cNvPr id="3" name="Textfeld 2">
+            <a:extLst>
+              <a:ext uri="{FF2B5EF4-FFF2-40B4-BE49-F238E27FC236}">
+                <a16:creationId xmlns:a16="http://schemas.microsoft.com/office/drawing/2014/main" id="{2029A431-55B4-AC3E-24A9-CD597295B495}"/>
+              </a:ext>
+            </a:extLst>
+          </p:cNvPr>
+          <p:cNvSpPr txBox="1"/>
+          <p:nvPr/>
+        </p:nvSpPr>
+        <p:spPr>
+          <a:xfrm>
+            <a:off x="8138393" y="13732"/>
+            <a:ext cx="2401619" cy="261610"/>
+          </a:xfrm>
+          <a:prstGeom prst="rect">
+            <a:avLst/>
+          </a:prstGeom>
+          <a:noFill/>
+        </p:spPr>
+        <p:txBody>
+          <a:bodyPr wrap="none" rtlCol="0">
+            <a:spAutoFit/>
+          </a:bodyPr>
+          <a:lstStyle/>
+          <a:p>
+            <a:r>
+              <a:rPr lang="de-DE" sz="1100" b="1">
+                <a:solidFill>
+                  <a:srgbClr val="00B050"/>
+                </a:solidFill>
+              </a:rPr>
+              <a:t>Notification for new ControlConstruct</a:t>
+            </a:r>
+          </a:p>
+        </p:txBody>
+      </p:sp>
+      <p:sp>
+        <p:nvSpPr>
+          <p:cNvPr id="9" name="Scrollen: vertikal 8">
+            <a:extLst>
+              <a:ext uri="{FF2B5EF4-FFF2-40B4-BE49-F238E27FC236}">
+                <a16:creationId xmlns:a16="http://schemas.microsoft.com/office/drawing/2014/main" id="{A1F971F9-603F-8A87-EB97-CAFDA98B0DBE}"/>
+              </a:ext>
+            </a:extLst>
+          </p:cNvPr>
+          <p:cNvSpPr/>
+          <p:nvPr/>
+        </p:nvSpPr>
+        <p:spPr>
+          <a:xfrm>
+            <a:off x="7745147" y="1521246"/>
+            <a:ext cx="186794" cy="161612"/>
+          </a:xfrm>
+          <a:prstGeom prst="verticalScroll">
+            <a:avLst/>
+          </a:prstGeom>
+        </p:spPr>
+        <p:style>
+          <a:lnRef idx="2">
+            <a:schemeClr val="accent4">
+              <a:shade val="50000"/>
+            </a:schemeClr>
+          </a:lnRef>
+          <a:fillRef idx="1">
+            <a:schemeClr val="accent4"/>
+          </a:fillRef>
+          <a:effectRef idx="0">
+            <a:schemeClr val="accent4"/>
+          </a:effectRef>
+          <a:fontRef idx="minor">
+            <a:schemeClr val="lt1"/>
+          </a:fontRef>
+        </p:style>
+        <p:txBody>
+          <a:bodyPr rtlCol="0" anchor="ctr"/>
+          <a:lstStyle/>
+          <a:p>
+            <a:pPr algn="ctr"/>
+            <a:endParaRPr lang="de-DE"/>
+          </a:p>
+        </p:txBody>
+      </p:sp>
+      <p:sp>
+        <p:nvSpPr>
+          <p:cNvPr id="10" name="Rechteck 9">
+            <a:extLst>
+              <a:ext uri="{FF2B5EF4-FFF2-40B4-BE49-F238E27FC236}">
+                <a16:creationId xmlns:a16="http://schemas.microsoft.com/office/drawing/2014/main" id="{9D82CCC2-F8A0-9A91-F077-BD950CBC465D}"/>
+              </a:ext>
+            </a:extLst>
+          </p:cNvPr>
+          <p:cNvSpPr/>
+          <p:nvPr/>
+        </p:nvSpPr>
+        <p:spPr>
+          <a:xfrm>
+            <a:off x="7274608" y="263253"/>
+            <a:ext cx="4301816" cy="1577005"/>
+          </a:xfrm>
+          <a:prstGeom prst="rect">
+            <a:avLst/>
+          </a:prstGeom>
+          <a:noFill/>
+          <a:ln>
+            <a:solidFill>
+              <a:srgbClr val="00B050"/>
+            </a:solidFill>
+          </a:ln>
+        </p:spPr>
+        <p:style>
+          <a:lnRef idx="2">
+            <a:schemeClr val="accent1">
+              <a:shade val="50000"/>
+            </a:schemeClr>
+          </a:lnRef>
+          <a:fillRef idx="1">
+            <a:schemeClr val="accent1"/>
+          </a:fillRef>
+          <a:effectRef idx="0">
+            <a:schemeClr val="accent1"/>
+          </a:effectRef>
+          <a:fontRef idx="minor">
+            <a:schemeClr val="lt1"/>
+          </a:fontRef>
+        </p:style>
+        <p:txBody>
+          <a:bodyPr rtlCol="0" anchor="ctr"/>
+          <a:lstStyle/>
+          <a:p>
+            <a:pPr algn="ctr"/>
+            <a:endParaRPr lang="de-DE"/>
           </a:p>
         </p:txBody>
       </p:sp>
@@ -4469,7 +4714,7 @@
         <p:spPr>
           <a:xfrm>
             <a:off x="5274153" y="890602"/>
-            <a:ext cx="4315427" cy="1848108"/>
+            <a:ext cx="4315427" cy="1820805"/>
           </a:xfrm>
           <a:prstGeom prst="rect">
             <a:avLst/>
@@ -5043,6 +5288,11 @@
             <a:avLst/>
           </a:prstGeom>
           <a:ln>
+            <a:solidFill>
+              <a:schemeClr val="accent2">
+                <a:lumMod val="75000"/>
+              </a:schemeClr>
+            </a:solidFill>
             <a:tailEnd type="triangle"/>
           </a:ln>
         </p:spPr>
@@ -5381,10 +5631,1181 @@
           </a:p>
         </p:txBody>
       </p:sp>
+      <p:sp>
+        <p:nvSpPr>
+          <p:cNvPr id="10" name="Textfeld 9">
+            <a:extLst>
+              <a:ext uri="{FF2B5EF4-FFF2-40B4-BE49-F238E27FC236}">
+                <a16:creationId xmlns:a16="http://schemas.microsoft.com/office/drawing/2014/main" id="{8CB1C4DD-B01D-4B25-B8A9-70B2626028C4}"/>
+              </a:ext>
+            </a:extLst>
+          </p:cNvPr>
+          <p:cNvSpPr txBox="1"/>
+          <p:nvPr/>
+        </p:nvSpPr>
+        <p:spPr>
+          <a:xfrm>
+            <a:off x="6080331" y="2288825"/>
+            <a:ext cx="2942645" cy="261610"/>
+          </a:xfrm>
+          <a:prstGeom prst="rect">
+            <a:avLst/>
+          </a:prstGeom>
+          <a:noFill/>
+        </p:spPr>
+        <p:txBody>
+          <a:bodyPr wrap="square" rtlCol="0">
+            <a:spAutoFit/>
+          </a:bodyPr>
+          <a:lstStyle/>
+          <a:p>
+            <a:r>
+              <a:rPr lang="de-DE" sz="1100"/>
+              <a:t>_objIdRef = &lt;uuid&gt; = mount-name + ltp-uuid</a:t>
+            </a:r>
+            <a:endParaRPr lang="de-DE" sz="1000" i="1"/>
+          </a:p>
+        </p:txBody>
+      </p:sp>
+      <p:sp>
+        <p:nvSpPr>
+          <p:cNvPr id="12" name="Scrollen: vertikal 11">
+            <a:extLst>
+              <a:ext uri="{FF2B5EF4-FFF2-40B4-BE49-F238E27FC236}">
+                <a16:creationId xmlns:a16="http://schemas.microsoft.com/office/drawing/2014/main" id="{A493D264-81A3-32BC-7B3A-7200667FDCDD}"/>
+              </a:ext>
+            </a:extLst>
+          </p:cNvPr>
+          <p:cNvSpPr/>
+          <p:nvPr/>
+        </p:nvSpPr>
+        <p:spPr>
+          <a:xfrm>
+            <a:off x="5840950" y="2340300"/>
+            <a:ext cx="179972" cy="161612"/>
+          </a:xfrm>
+          <a:prstGeom prst="verticalScroll">
+            <a:avLst/>
+          </a:prstGeom>
+        </p:spPr>
+        <p:style>
+          <a:lnRef idx="2">
+            <a:schemeClr val="accent4">
+              <a:shade val="50000"/>
+            </a:schemeClr>
+          </a:lnRef>
+          <a:fillRef idx="1">
+            <a:schemeClr val="accent4"/>
+          </a:fillRef>
+          <a:effectRef idx="0">
+            <a:schemeClr val="accent4"/>
+          </a:effectRef>
+          <a:fontRef idx="minor">
+            <a:schemeClr val="lt1"/>
+          </a:fontRef>
+        </p:style>
+        <p:txBody>
+          <a:bodyPr rtlCol="0" anchor="ctr"/>
+          <a:lstStyle/>
+          <a:p>
+            <a:pPr algn="ctr"/>
+            <a:endParaRPr lang="de-DE"/>
+          </a:p>
+        </p:txBody>
+      </p:sp>
+      <p:sp>
+        <p:nvSpPr>
+          <p:cNvPr id="15" name="Rechteck 14">
+            <a:extLst>
+              <a:ext uri="{FF2B5EF4-FFF2-40B4-BE49-F238E27FC236}">
+                <a16:creationId xmlns:a16="http://schemas.microsoft.com/office/drawing/2014/main" id="{0131B980-109B-7947-BB1D-E696D9CA67AB}"/>
+              </a:ext>
+            </a:extLst>
+          </p:cNvPr>
+          <p:cNvSpPr/>
+          <p:nvPr/>
+        </p:nvSpPr>
+        <p:spPr>
+          <a:xfrm>
+            <a:off x="5520705" y="810559"/>
+            <a:ext cx="4144699" cy="1848754"/>
+          </a:xfrm>
+          <a:prstGeom prst="rect">
+            <a:avLst/>
+          </a:prstGeom>
+          <a:noFill/>
+          <a:ln>
+            <a:solidFill>
+              <a:srgbClr val="00B050"/>
+            </a:solidFill>
+          </a:ln>
+        </p:spPr>
+        <p:style>
+          <a:lnRef idx="2">
+            <a:schemeClr val="accent1">
+              <a:shade val="50000"/>
+            </a:schemeClr>
+          </a:lnRef>
+          <a:fillRef idx="1">
+            <a:schemeClr val="accent1"/>
+          </a:fillRef>
+          <a:effectRef idx="0">
+            <a:schemeClr val="accent1"/>
+          </a:effectRef>
+          <a:fontRef idx="minor">
+            <a:schemeClr val="lt1"/>
+          </a:fontRef>
+        </p:style>
+        <p:txBody>
+          <a:bodyPr rtlCol="0" anchor="ctr"/>
+          <a:lstStyle/>
+          <a:p>
+            <a:pPr algn="ctr"/>
+            <a:endParaRPr lang="de-DE"/>
+          </a:p>
+        </p:txBody>
+      </p:sp>
     </p:spTree>
     <p:extLst>
       <p:ext uri="{BB962C8B-B14F-4D97-AF65-F5344CB8AC3E}">
         <p14:creationId xmlns:p14="http://schemas.microsoft.com/office/powerpoint/2010/main" val="721686558"/>
+      </p:ext>
+    </p:extLst>
+  </p:cSld>
+  <p:clrMapOvr>
+    <a:masterClrMapping/>
+  </p:clrMapOvr>
+</p:sld>
+</file>
+
+<file path=ppt/slides/slide4.xml><?xml version="1.0" encoding="utf-8"?>
+<p:sld xmlns:a="http://schemas.openxmlformats.org/drawingml/2006/main" xmlns:r="http://schemas.openxmlformats.org/officeDocument/2006/relationships" xmlns:p="http://schemas.openxmlformats.org/presentationml/2006/main">
+  <p:cSld>
+    <p:spTree>
+      <p:nvGrpSpPr>
+        <p:cNvPr id="1" name=""/>
+        <p:cNvGrpSpPr/>
+        <p:nvPr/>
+      </p:nvGrpSpPr>
+      <p:grpSpPr>
+        <a:xfrm>
+          <a:off x="0" y="0"/>
+          <a:ext cx="0" cy="0"/>
+          <a:chOff x="0" y="0"/>
+          <a:chExt cx="0" cy="0"/>
+        </a:xfrm>
+      </p:grpSpPr>
+      <p:sp>
+        <p:nvSpPr>
+          <p:cNvPr id="4" name="Rechteck 3">
+            <a:extLst>
+              <a:ext uri="{FF2B5EF4-FFF2-40B4-BE49-F238E27FC236}">
+                <a16:creationId xmlns:a16="http://schemas.microsoft.com/office/drawing/2014/main" id="{41868FAA-F23A-57A1-8B0B-019D5B64C556}"/>
+              </a:ext>
+            </a:extLst>
+          </p:cNvPr>
+          <p:cNvSpPr/>
+          <p:nvPr/>
+        </p:nvSpPr>
+        <p:spPr>
+          <a:xfrm>
+            <a:off x="2422859" y="4491969"/>
+            <a:ext cx="1425678" cy="747251"/>
+          </a:xfrm>
+          <a:prstGeom prst="rect">
+            <a:avLst/>
+          </a:prstGeom>
+        </p:spPr>
+        <p:style>
+          <a:lnRef idx="2">
+            <a:schemeClr val="accent1">
+              <a:shade val="50000"/>
+            </a:schemeClr>
+          </a:lnRef>
+          <a:fillRef idx="1">
+            <a:schemeClr val="accent1"/>
+          </a:fillRef>
+          <a:effectRef idx="0">
+            <a:schemeClr val="accent1"/>
+          </a:effectRef>
+          <a:fontRef idx="minor">
+            <a:schemeClr val="lt1"/>
+          </a:fontRef>
+        </p:style>
+        <p:txBody>
+          <a:bodyPr rtlCol="0" anchor="ctr"/>
+          <a:lstStyle/>
+          <a:p>
+            <a:pPr algn="ctr"/>
+            <a:r>
+              <a:rPr lang="de-DE" dirty="0"/>
+              <a:t>LTP</a:t>
+            </a:r>
+          </a:p>
+        </p:txBody>
+      </p:sp>
+      <p:cxnSp>
+        <p:nvCxnSpPr>
+          <p:cNvPr id="7" name="Gerade Verbindung mit Pfeil 6">
+            <a:extLst>
+              <a:ext uri="{FF2B5EF4-FFF2-40B4-BE49-F238E27FC236}">
+                <a16:creationId xmlns:a16="http://schemas.microsoft.com/office/drawing/2014/main" id="{A5450481-0C8A-386C-3132-0A44D9544E44}"/>
+              </a:ext>
+            </a:extLst>
+          </p:cNvPr>
+          <p:cNvCxnSpPr>
+            <a:cxnSpLocks/>
+            <a:stCxn id="6" idx="2"/>
+            <a:endCxn id="4" idx="0"/>
+          </p:cNvCxnSpPr>
+          <p:nvPr/>
+        </p:nvCxnSpPr>
+        <p:spPr>
+          <a:xfrm flipH="1">
+            <a:off x="3135698" y="3430085"/>
+            <a:ext cx="639097" cy="1061884"/>
+          </a:xfrm>
+          <a:prstGeom prst="straightConnector1">
+            <a:avLst/>
+          </a:prstGeom>
+          <a:ln>
+            <a:tailEnd type="triangle"/>
+          </a:ln>
+        </p:spPr>
+        <p:style>
+          <a:lnRef idx="1">
+            <a:schemeClr val="accent1"/>
+          </a:lnRef>
+          <a:fillRef idx="0">
+            <a:schemeClr val="accent1"/>
+          </a:fillRef>
+          <a:effectRef idx="0">
+            <a:schemeClr val="accent1"/>
+          </a:effectRef>
+          <a:fontRef idx="minor">
+            <a:schemeClr val="tx1"/>
+          </a:fontRef>
+        </p:style>
+      </p:cxnSp>
+      <p:sp>
+        <p:nvSpPr>
+          <p:cNvPr id="6" name="Rechteck 5">
+            <a:extLst>
+              <a:ext uri="{FF2B5EF4-FFF2-40B4-BE49-F238E27FC236}">
+                <a16:creationId xmlns:a16="http://schemas.microsoft.com/office/drawing/2014/main" id="{6BF9408E-4653-AF14-886C-0791AAD5FA4D}"/>
+              </a:ext>
+            </a:extLst>
+          </p:cNvPr>
+          <p:cNvSpPr/>
+          <p:nvPr/>
+        </p:nvSpPr>
+        <p:spPr>
+          <a:xfrm>
+            <a:off x="3061956" y="2682834"/>
+            <a:ext cx="1425678" cy="747251"/>
+          </a:xfrm>
+          <a:prstGeom prst="rect">
+            <a:avLst/>
+          </a:prstGeom>
+        </p:spPr>
+        <p:style>
+          <a:lnRef idx="2">
+            <a:schemeClr val="accent1">
+              <a:shade val="50000"/>
+            </a:schemeClr>
+          </a:lnRef>
+          <a:fillRef idx="1">
+            <a:schemeClr val="accent1"/>
+          </a:fillRef>
+          <a:effectRef idx="0">
+            <a:schemeClr val="accent1"/>
+          </a:effectRef>
+          <a:fontRef idx="minor">
+            <a:schemeClr val="lt1"/>
+          </a:fontRef>
+        </p:style>
+        <p:txBody>
+          <a:bodyPr rtlCol="0" anchor="ctr"/>
+          <a:lstStyle/>
+          <a:p>
+            <a:pPr algn="ctr"/>
+            <a:r>
+              <a:rPr lang="de-DE" dirty="0"/>
+              <a:t>CC</a:t>
+            </a:r>
+          </a:p>
+        </p:txBody>
+      </p:sp>
+      <p:sp>
+        <p:nvSpPr>
+          <p:cNvPr id="11" name="Textfeld 10">
+            <a:extLst>
+              <a:ext uri="{FF2B5EF4-FFF2-40B4-BE49-F238E27FC236}">
+                <a16:creationId xmlns:a16="http://schemas.microsoft.com/office/drawing/2014/main" id="{A1B5B915-7150-3AEC-582B-E266BDDD2F01}"/>
+              </a:ext>
+            </a:extLst>
+          </p:cNvPr>
+          <p:cNvSpPr txBox="1"/>
+          <p:nvPr/>
+        </p:nvSpPr>
+        <p:spPr>
+          <a:xfrm>
+            <a:off x="3305205" y="4177336"/>
+            <a:ext cx="300082" cy="369332"/>
+          </a:xfrm>
+          <a:prstGeom prst="rect">
+            <a:avLst/>
+          </a:prstGeom>
+          <a:noFill/>
+        </p:spPr>
+        <p:txBody>
+          <a:bodyPr wrap="none" rtlCol="0">
+            <a:spAutoFit/>
+          </a:bodyPr>
+          <a:lstStyle/>
+          <a:p>
+            <a:r>
+              <a:rPr lang="de-DE" dirty="0"/>
+              <a:t>*</a:t>
+            </a:r>
+          </a:p>
+        </p:txBody>
+      </p:sp>
+      <p:sp>
+        <p:nvSpPr>
+          <p:cNvPr id="13" name="Rechteck 12">
+            <a:extLst>
+              <a:ext uri="{FF2B5EF4-FFF2-40B4-BE49-F238E27FC236}">
+                <a16:creationId xmlns:a16="http://schemas.microsoft.com/office/drawing/2014/main" id="{298D05AD-5D66-271D-CC5E-89848C4AA757}"/>
+              </a:ext>
+            </a:extLst>
+          </p:cNvPr>
+          <p:cNvSpPr/>
+          <p:nvPr/>
+        </p:nvSpPr>
+        <p:spPr>
+          <a:xfrm>
+            <a:off x="5018575" y="918564"/>
+            <a:ext cx="1425678" cy="747251"/>
+          </a:xfrm>
+          <a:prstGeom prst="rect">
+            <a:avLst/>
+          </a:prstGeom>
+        </p:spPr>
+        <p:style>
+          <a:lnRef idx="2">
+            <a:schemeClr val="accent1">
+              <a:shade val="50000"/>
+            </a:schemeClr>
+          </a:lnRef>
+          <a:fillRef idx="1">
+            <a:schemeClr val="accent1"/>
+          </a:fillRef>
+          <a:effectRef idx="0">
+            <a:schemeClr val="accent1"/>
+          </a:effectRef>
+          <a:fontRef idx="minor">
+            <a:schemeClr val="lt1"/>
+          </a:fontRef>
+        </p:style>
+        <p:txBody>
+          <a:bodyPr rtlCol="0" anchor="ctr"/>
+          <a:lstStyle/>
+          <a:p>
+            <a:pPr algn="ctr"/>
+            <a:r>
+              <a:rPr lang="de-DE" dirty="0"/>
+              <a:t>SDN-Control-Domain</a:t>
+            </a:r>
+          </a:p>
+        </p:txBody>
+      </p:sp>
+      <p:cxnSp>
+        <p:nvCxnSpPr>
+          <p:cNvPr id="14" name="Gerade Verbindung mit Pfeil 13">
+            <a:extLst>
+              <a:ext uri="{FF2B5EF4-FFF2-40B4-BE49-F238E27FC236}">
+                <a16:creationId xmlns:a16="http://schemas.microsoft.com/office/drawing/2014/main" id="{3B29907C-9D6C-2190-0312-2E578383A75E}"/>
+              </a:ext>
+            </a:extLst>
+          </p:cNvPr>
+          <p:cNvCxnSpPr>
+            <a:cxnSpLocks/>
+            <a:stCxn id="13" idx="2"/>
+            <a:endCxn id="6" idx="0"/>
+          </p:cNvCxnSpPr>
+          <p:nvPr/>
+        </p:nvCxnSpPr>
+        <p:spPr>
+          <a:xfrm flipH="1">
+            <a:off x="3774795" y="1665815"/>
+            <a:ext cx="1956619" cy="1017019"/>
+          </a:xfrm>
+          <a:prstGeom prst="straightConnector1">
+            <a:avLst/>
+          </a:prstGeom>
+          <a:ln>
+            <a:tailEnd type="triangle"/>
+          </a:ln>
+        </p:spPr>
+        <p:style>
+          <a:lnRef idx="1">
+            <a:schemeClr val="accent1"/>
+          </a:lnRef>
+          <a:fillRef idx="0">
+            <a:schemeClr val="accent1"/>
+          </a:fillRef>
+          <a:effectRef idx="0">
+            <a:schemeClr val="accent1"/>
+          </a:effectRef>
+          <a:fontRef idx="minor">
+            <a:schemeClr val="tx1"/>
+          </a:fontRef>
+        </p:style>
+      </p:cxnSp>
+      <p:sp>
+        <p:nvSpPr>
+          <p:cNvPr id="18" name="Textfeld 17">
+            <a:extLst>
+              <a:ext uri="{FF2B5EF4-FFF2-40B4-BE49-F238E27FC236}">
+                <a16:creationId xmlns:a16="http://schemas.microsoft.com/office/drawing/2014/main" id="{AEF99DD7-23F8-80C2-1E8C-C44068F22E2D}"/>
+              </a:ext>
+            </a:extLst>
+          </p:cNvPr>
+          <p:cNvSpPr txBox="1"/>
+          <p:nvPr/>
+        </p:nvSpPr>
+        <p:spPr>
+          <a:xfrm>
+            <a:off x="4072121" y="2427194"/>
+            <a:ext cx="300082" cy="369332"/>
+          </a:xfrm>
+          <a:prstGeom prst="rect">
+            <a:avLst/>
+          </a:prstGeom>
+          <a:noFill/>
+        </p:spPr>
+        <p:txBody>
+          <a:bodyPr wrap="none" rtlCol="0">
+            <a:spAutoFit/>
+          </a:bodyPr>
+          <a:lstStyle/>
+          <a:p>
+            <a:r>
+              <a:rPr lang="de-DE" dirty="0"/>
+              <a:t>*</a:t>
+            </a:r>
+          </a:p>
+        </p:txBody>
+      </p:sp>
+      <p:cxnSp>
+        <p:nvCxnSpPr>
+          <p:cNvPr id="19" name="Gerade Verbindung mit Pfeil 18">
+            <a:extLst>
+              <a:ext uri="{FF2B5EF4-FFF2-40B4-BE49-F238E27FC236}">
+                <a16:creationId xmlns:a16="http://schemas.microsoft.com/office/drawing/2014/main" id="{8C6DAD84-5E8B-E07C-4782-07DCC0681DF7}"/>
+              </a:ext>
+            </a:extLst>
+          </p:cNvPr>
+          <p:cNvCxnSpPr>
+            <a:cxnSpLocks/>
+            <a:stCxn id="13" idx="2"/>
+            <a:endCxn id="23" idx="0"/>
+          </p:cNvCxnSpPr>
+          <p:nvPr/>
+        </p:nvCxnSpPr>
+        <p:spPr>
+          <a:xfrm>
+            <a:off x="5731414" y="1665815"/>
+            <a:ext cx="1425678" cy="1820805"/>
+          </a:xfrm>
+          <a:prstGeom prst="straightConnector1">
+            <a:avLst/>
+          </a:prstGeom>
+          <a:ln>
+            <a:tailEnd type="triangle"/>
+          </a:ln>
+        </p:spPr>
+        <p:style>
+          <a:lnRef idx="1">
+            <a:schemeClr val="accent1"/>
+          </a:lnRef>
+          <a:fillRef idx="0">
+            <a:schemeClr val="accent1"/>
+          </a:fillRef>
+          <a:effectRef idx="0">
+            <a:schemeClr val="accent1"/>
+          </a:effectRef>
+          <a:fontRef idx="minor">
+            <a:schemeClr val="tx1"/>
+          </a:fontRef>
+        </p:style>
+      </p:cxnSp>
+      <p:sp>
+        <p:nvSpPr>
+          <p:cNvPr id="23" name="Rechteck 22">
+            <a:extLst>
+              <a:ext uri="{FF2B5EF4-FFF2-40B4-BE49-F238E27FC236}">
+                <a16:creationId xmlns:a16="http://schemas.microsoft.com/office/drawing/2014/main" id="{0657224B-3501-0B57-9FF9-AF3D4B8F760D}"/>
+              </a:ext>
+            </a:extLst>
+          </p:cNvPr>
+          <p:cNvSpPr/>
+          <p:nvPr/>
+        </p:nvSpPr>
+        <p:spPr>
+          <a:xfrm>
+            <a:off x="6444253" y="3486620"/>
+            <a:ext cx="1425678" cy="747251"/>
+          </a:xfrm>
+          <a:prstGeom prst="rect">
+            <a:avLst/>
+          </a:prstGeom>
+        </p:spPr>
+        <p:style>
+          <a:lnRef idx="2">
+            <a:schemeClr val="accent1">
+              <a:shade val="50000"/>
+            </a:schemeClr>
+          </a:lnRef>
+          <a:fillRef idx="1">
+            <a:schemeClr val="accent1"/>
+          </a:fillRef>
+          <a:effectRef idx="0">
+            <a:schemeClr val="accent1"/>
+          </a:effectRef>
+          <a:fontRef idx="minor">
+            <a:schemeClr val="lt1"/>
+          </a:fontRef>
+        </p:style>
+        <p:txBody>
+          <a:bodyPr rtlCol="0" anchor="ctr"/>
+          <a:lstStyle/>
+          <a:p>
+            <a:pPr algn="ctr"/>
+            <a:r>
+              <a:rPr lang="de-DE" dirty="0"/>
+              <a:t>Links</a:t>
+            </a:r>
+          </a:p>
+        </p:txBody>
+      </p:sp>
+      <p:sp>
+        <p:nvSpPr>
+          <p:cNvPr id="27" name="Textfeld 26">
+            <a:extLst>
+              <a:ext uri="{FF2B5EF4-FFF2-40B4-BE49-F238E27FC236}">
+                <a16:creationId xmlns:a16="http://schemas.microsoft.com/office/drawing/2014/main" id="{07946B62-0E9F-18AA-5A63-857B39824E5B}"/>
+              </a:ext>
+            </a:extLst>
+          </p:cNvPr>
+          <p:cNvSpPr txBox="1"/>
+          <p:nvPr/>
+        </p:nvSpPr>
+        <p:spPr>
+          <a:xfrm>
+            <a:off x="7157092" y="3198406"/>
+            <a:ext cx="300082" cy="369332"/>
+          </a:xfrm>
+          <a:prstGeom prst="rect">
+            <a:avLst/>
+          </a:prstGeom>
+          <a:noFill/>
+        </p:spPr>
+        <p:txBody>
+          <a:bodyPr wrap="none" rtlCol="0">
+            <a:spAutoFit/>
+          </a:bodyPr>
+          <a:lstStyle/>
+          <a:p>
+            <a:r>
+              <a:rPr lang="de-DE" dirty="0"/>
+              <a:t>*</a:t>
+            </a:r>
+          </a:p>
+        </p:txBody>
+      </p:sp>
+      <p:cxnSp>
+        <p:nvCxnSpPr>
+          <p:cNvPr id="28" name="Gerade Verbindung mit Pfeil 27">
+            <a:extLst>
+              <a:ext uri="{FF2B5EF4-FFF2-40B4-BE49-F238E27FC236}">
+                <a16:creationId xmlns:a16="http://schemas.microsoft.com/office/drawing/2014/main" id="{3C89BA06-860E-ACC3-F1A2-1A55245B65A0}"/>
+              </a:ext>
+            </a:extLst>
+          </p:cNvPr>
+          <p:cNvCxnSpPr>
+            <a:cxnSpLocks/>
+            <a:stCxn id="23" idx="2"/>
+            <a:endCxn id="4" idx="3"/>
+          </p:cNvCxnSpPr>
+          <p:nvPr/>
+        </p:nvCxnSpPr>
+        <p:spPr>
+          <a:xfrm flipH="1">
+            <a:off x="3848537" y="4233871"/>
+            <a:ext cx="3308555" cy="631724"/>
+          </a:xfrm>
+          <a:prstGeom prst="straightConnector1">
+            <a:avLst/>
+          </a:prstGeom>
+          <a:ln>
+            <a:tailEnd type="triangle"/>
+          </a:ln>
+        </p:spPr>
+        <p:style>
+          <a:lnRef idx="1">
+            <a:schemeClr val="accent1"/>
+          </a:lnRef>
+          <a:fillRef idx="0">
+            <a:schemeClr val="accent1"/>
+          </a:fillRef>
+          <a:effectRef idx="0">
+            <a:schemeClr val="accent1"/>
+          </a:effectRef>
+          <a:fontRef idx="minor">
+            <a:schemeClr val="tx1"/>
+          </a:fontRef>
+        </p:style>
+      </p:cxnSp>
+      <p:sp>
+        <p:nvSpPr>
+          <p:cNvPr id="34" name="Textfeld 33">
+            <a:extLst>
+              <a:ext uri="{FF2B5EF4-FFF2-40B4-BE49-F238E27FC236}">
+                <a16:creationId xmlns:a16="http://schemas.microsoft.com/office/drawing/2014/main" id="{85A675B9-B9C4-5831-0D07-0E5E2E853FE8}"/>
+              </a:ext>
+            </a:extLst>
+          </p:cNvPr>
+          <p:cNvSpPr txBox="1"/>
+          <p:nvPr/>
+        </p:nvSpPr>
+        <p:spPr>
+          <a:xfrm>
+            <a:off x="3904874" y="4869888"/>
+            <a:ext cx="300082" cy="369332"/>
+          </a:xfrm>
+          <a:prstGeom prst="rect">
+            <a:avLst/>
+          </a:prstGeom>
+          <a:noFill/>
+        </p:spPr>
+        <p:txBody>
+          <a:bodyPr wrap="none" rtlCol="0">
+            <a:spAutoFit/>
+          </a:bodyPr>
+          <a:lstStyle/>
+          <a:p>
+            <a:r>
+              <a:rPr lang="de-DE" dirty="0"/>
+              <a:t>*</a:t>
+            </a:r>
+          </a:p>
+        </p:txBody>
+      </p:sp>
+      <p:pic>
+        <p:nvPicPr>
+          <p:cNvPr id="3" name="Grafik 2">
+            <a:extLst>
+              <a:ext uri="{FF2B5EF4-FFF2-40B4-BE49-F238E27FC236}">
+                <a16:creationId xmlns:a16="http://schemas.microsoft.com/office/drawing/2014/main" id="{E4B0D0D8-93DB-6440-606E-6754C2D929EF}"/>
+              </a:ext>
+            </a:extLst>
+          </p:cNvPr>
+          <p:cNvPicPr>
+            <a:picLocks noChangeAspect="1"/>
+          </p:cNvPicPr>
+          <p:nvPr/>
+        </p:nvPicPr>
+        <p:blipFill>
+          <a:blip r:embed="rId2"/>
+          <a:stretch>
+            <a:fillRect/>
+          </a:stretch>
+        </p:blipFill>
+        <p:spPr>
+          <a:xfrm>
+            <a:off x="100315" y="666298"/>
+            <a:ext cx="4200525" cy="1771650"/>
+          </a:xfrm>
+          <a:prstGeom prst="rect">
+            <a:avLst/>
+          </a:prstGeom>
+        </p:spPr>
+      </p:pic>
+      <p:cxnSp>
+        <p:nvCxnSpPr>
+          <p:cNvPr id="10" name="Gerade Verbindung mit Pfeil 9">
+            <a:extLst>
+              <a:ext uri="{FF2B5EF4-FFF2-40B4-BE49-F238E27FC236}">
+                <a16:creationId xmlns:a16="http://schemas.microsoft.com/office/drawing/2014/main" id="{C34382BF-FB60-7E68-5572-6C0952CCB3F1}"/>
+              </a:ext>
+            </a:extLst>
+          </p:cNvPr>
+          <p:cNvCxnSpPr/>
+          <p:nvPr/>
+        </p:nvCxnSpPr>
+        <p:spPr>
+          <a:xfrm flipV="1">
+            <a:off x="3412375" y="1208303"/>
+            <a:ext cx="1490769" cy="148105"/>
+          </a:xfrm>
+          <a:prstGeom prst="straightConnector1">
+            <a:avLst/>
+          </a:prstGeom>
+          <a:ln>
+            <a:tailEnd type="triangle"/>
+          </a:ln>
+        </p:spPr>
+        <p:style>
+          <a:lnRef idx="1">
+            <a:schemeClr val="accent4"/>
+          </a:lnRef>
+          <a:fillRef idx="0">
+            <a:schemeClr val="accent4"/>
+          </a:fillRef>
+          <a:effectRef idx="0">
+            <a:schemeClr val="accent4"/>
+          </a:effectRef>
+          <a:fontRef idx="minor">
+            <a:schemeClr val="tx1"/>
+          </a:fontRef>
+        </p:style>
+      </p:cxnSp>
+      <p:cxnSp>
+        <p:nvCxnSpPr>
+          <p:cNvPr id="15" name="Gerade Verbindung mit Pfeil 14">
+            <a:extLst>
+              <a:ext uri="{FF2B5EF4-FFF2-40B4-BE49-F238E27FC236}">
+                <a16:creationId xmlns:a16="http://schemas.microsoft.com/office/drawing/2014/main" id="{79BEA6E0-737A-9071-C0B0-D5F763B37C63}"/>
+              </a:ext>
+            </a:extLst>
+          </p:cNvPr>
+          <p:cNvCxnSpPr/>
+          <p:nvPr/>
+        </p:nvCxnSpPr>
+        <p:spPr>
+          <a:xfrm>
+            <a:off x="1383431" y="1569495"/>
+            <a:ext cx="3233833" cy="661204"/>
+          </a:xfrm>
+          <a:prstGeom prst="straightConnector1">
+            <a:avLst/>
+          </a:prstGeom>
+          <a:ln>
+            <a:tailEnd type="triangle"/>
+          </a:ln>
+        </p:spPr>
+        <p:style>
+          <a:lnRef idx="1">
+            <a:schemeClr val="accent4"/>
+          </a:lnRef>
+          <a:fillRef idx="0">
+            <a:schemeClr val="accent4"/>
+          </a:fillRef>
+          <a:effectRef idx="0">
+            <a:schemeClr val="accent4"/>
+          </a:effectRef>
+          <a:fontRef idx="minor">
+            <a:schemeClr val="tx1"/>
+          </a:fontRef>
+        </p:style>
+      </p:cxnSp>
+      <p:sp>
+        <p:nvSpPr>
+          <p:cNvPr id="17" name="Textfeld 16">
+            <a:extLst>
+              <a:ext uri="{FF2B5EF4-FFF2-40B4-BE49-F238E27FC236}">
+                <a16:creationId xmlns:a16="http://schemas.microsoft.com/office/drawing/2014/main" id="{512BBF6E-7B9C-A649-B6CD-0EFA62E1FF4A}"/>
+              </a:ext>
+            </a:extLst>
+          </p:cNvPr>
+          <p:cNvSpPr txBox="1"/>
+          <p:nvPr/>
+        </p:nvSpPr>
+        <p:spPr>
+          <a:xfrm>
+            <a:off x="0" y="101173"/>
+            <a:ext cx="11765291" cy="276999"/>
+          </a:xfrm>
+          <a:prstGeom prst="rect">
+            <a:avLst/>
+          </a:prstGeom>
+          <a:noFill/>
+        </p:spPr>
+        <p:txBody>
+          <a:bodyPr wrap="square">
+            <a:spAutoFit/>
+          </a:bodyPr>
+          <a:lstStyle/>
+          <a:p>
+            <a:r>
+              <a:rPr lang="de-DE" sz="1200" b="0" i="0">
+                <a:solidFill>
+                  <a:srgbClr val="212121"/>
+                </a:solidFill>
+                <a:effectLst/>
+                <a:latin typeface="Inter"/>
+              </a:rPr>
+              <a:t>http://&lt;ctrlIP&gt;:8181/rests/data/network-topology:network-topology/topology=topology-netconf</a:t>
+            </a:r>
+            <a:endParaRPr lang="de-DE" sz="1200"/>
+          </a:p>
+        </p:txBody>
+      </p:sp>
+      <p:sp>
+        <p:nvSpPr>
+          <p:cNvPr id="21" name="Textfeld 20">
+            <a:extLst>
+              <a:ext uri="{FF2B5EF4-FFF2-40B4-BE49-F238E27FC236}">
+                <a16:creationId xmlns:a16="http://schemas.microsoft.com/office/drawing/2014/main" id="{95FBE992-6C34-7626-6AA2-D3BF694C9596}"/>
+              </a:ext>
+            </a:extLst>
+          </p:cNvPr>
+          <p:cNvSpPr txBox="1"/>
+          <p:nvPr/>
+        </p:nvSpPr>
+        <p:spPr>
+          <a:xfrm>
+            <a:off x="4960418" y="567131"/>
+            <a:ext cx="1601208" cy="369332"/>
+          </a:xfrm>
+          <a:prstGeom prst="rect">
+            <a:avLst/>
+          </a:prstGeom>
+          <a:noFill/>
+        </p:spPr>
+        <p:txBody>
+          <a:bodyPr wrap="none" rtlCol="0">
+            <a:spAutoFit/>
+          </a:bodyPr>
+          <a:lstStyle/>
+          <a:p>
+            <a:r>
+              <a:rPr lang="de-DE">
+                <a:solidFill>
+                  <a:srgbClr val="7030A0"/>
+                </a:solidFill>
+              </a:rPr>
+              <a:t>MWDI path „/“</a:t>
+            </a:r>
+          </a:p>
+        </p:txBody>
+      </p:sp>
+      <p:sp>
+        <p:nvSpPr>
+          <p:cNvPr id="2" name="Textfeld 1">
+            <a:extLst>
+              <a:ext uri="{FF2B5EF4-FFF2-40B4-BE49-F238E27FC236}">
+                <a16:creationId xmlns:a16="http://schemas.microsoft.com/office/drawing/2014/main" id="{BE97255D-6F9E-7CBD-10AB-C4219DC8B744}"/>
+              </a:ext>
+            </a:extLst>
+          </p:cNvPr>
+          <p:cNvSpPr txBox="1"/>
+          <p:nvPr/>
+        </p:nvSpPr>
+        <p:spPr>
+          <a:xfrm>
+            <a:off x="7457174" y="666298"/>
+            <a:ext cx="4262621" cy="1600438"/>
+          </a:xfrm>
+          <a:prstGeom prst="rect">
+            <a:avLst/>
+          </a:prstGeom>
+          <a:noFill/>
+          <a:ln>
+            <a:solidFill>
+              <a:srgbClr val="0070C0"/>
+            </a:solidFill>
+          </a:ln>
+        </p:spPr>
+        <p:txBody>
+          <a:bodyPr wrap="square" rtlCol="0">
+            <a:spAutoFit/>
+          </a:bodyPr>
+          <a:lstStyle/>
+          <a:p>
+            <a:r>
+              <a:rPr lang="de-DE" sz="1400" b="1">
+                <a:solidFill>
+                  <a:schemeClr val="accent1">
+                    <a:lumMod val="75000"/>
+                  </a:schemeClr>
+                </a:solidFill>
+              </a:rPr>
+              <a:t>MWNI</a:t>
+            </a:r>
+            <a:r>
+              <a:rPr lang="de-DE" sz="1400">
+                <a:solidFill>
+                  <a:schemeClr val="accent1">
+                    <a:lumMod val="75000"/>
+                  </a:schemeClr>
+                </a:solidFill>
+              </a:rPr>
+              <a:t> will provide two elements on topology-netconf level:</a:t>
+            </a:r>
+          </a:p>
+          <a:p>
+            <a:pPr marL="285750" indent="-285750">
+              <a:buFontTx/>
+              <a:buChar char="-"/>
+            </a:pPr>
+            <a:r>
+              <a:rPr lang="de-DE" sz="1400" b="1">
+                <a:solidFill>
+                  <a:schemeClr val="accent1">
+                    <a:lumMod val="75000"/>
+                  </a:schemeClr>
+                </a:solidFill>
+              </a:rPr>
+              <a:t>node list </a:t>
+            </a:r>
+            <a:r>
+              <a:rPr lang="de-DE" sz="1400">
+                <a:solidFill>
+                  <a:schemeClr val="accent1">
+                    <a:lumMod val="75000"/>
+                  </a:schemeClr>
+                </a:solidFill>
+              </a:rPr>
+              <a:t>(also in Controller)</a:t>
+            </a:r>
+          </a:p>
+          <a:p>
+            <a:pPr marL="285750" indent="-285750">
+              <a:buFontTx/>
+              <a:buChar char="-"/>
+            </a:pPr>
+            <a:r>
+              <a:rPr lang="de-DE" sz="1400" b="1">
+                <a:solidFill>
+                  <a:schemeClr val="accent1">
+                    <a:lumMod val="75000"/>
+                  </a:schemeClr>
+                </a:solidFill>
+              </a:rPr>
+              <a:t>link list </a:t>
+            </a:r>
+            <a:r>
+              <a:rPr lang="de-DE" sz="1400">
+                <a:solidFill>
+                  <a:schemeClr val="accent1">
+                    <a:lumMod val="75000"/>
+                  </a:schemeClr>
+                </a:solidFill>
+              </a:rPr>
+              <a:t>(NOT in Controller, just in App)</a:t>
+            </a:r>
+          </a:p>
+          <a:p>
+            <a:pPr marL="285750" indent="-285750">
+              <a:buFontTx/>
+              <a:buChar char="-"/>
+            </a:pPr>
+            <a:endParaRPr lang="de-DE" sz="1400">
+              <a:solidFill>
+                <a:schemeClr val="accent1">
+                  <a:lumMod val="75000"/>
+                </a:schemeClr>
+              </a:solidFill>
+            </a:endParaRPr>
+          </a:p>
+          <a:p>
+            <a:r>
+              <a:rPr lang="de-DE" sz="1400">
+                <a:solidFill>
+                  <a:schemeClr val="accent1">
+                    <a:lumMod val="75000"/>
+                  </a:schemeClr>
+                </a:solidFill>
+              </a:rPr>
+              <a:t>Link list: each link contains shared-associations between LTPs under the ControlConstructs</a:t>
+            </a:r>
+          </a:p>
+        </p:txBody>
+      </p:sp>
+    </p:spTree>
+    <p:extLst>
+      <p:ext uri="{BB962C8B-B14F-4D97-AF65-F5344CB8AC3E}">
+        <p14:creationId xmlns:p14="http://schemas.microsoft.com/office/powerpoint/2010/main" val="40976844"/>
+      </p:ext>
+    </p:extLst>
+  </p:cSld>
+  <p:clrMapOvr>
+    <a:masterClrMapping/>
+  </p:clrMapOvr>
+</p:sld>
+</file>
+
+<file path=ppt/slides/slide5.xml><?xml version="1.0" encoding="utf-8"?>
+<p:sld xmlns:a="http://schemas.openxmlformats.org/drawingml/2006/main" xmlns:r="http://schemas.openxmlformats.org/officeDocument/2006/relationships" xmlns:p="http://schemas.openxmlformats.org/presentationml/2006/main">
+  <p:cSld>
+    <p:spTree>
+      <p:nvGrpSpPr>
+        <p:cNvPr id="1" name=""/>
+        <p:cNvGrpSpPr/>
+        <p:nvPr/>
+      </p:nvGrpSpPr>
+      <p:grpSpPr>
+        <a:xfrm>
+          <a:off x="0" y="0"/>
+          <a:ext cx="0" cy="0"/>
+          <a:chOff x="0" y="0"/>
+          <a:chExt cx="0" cy="0"/>
+        </a:xfrm>
+      </p:grpSpPr>
+      <p:pic>
+        <p:nvPicPr>
+          <p:cNvPr id="7" name="Grafik 6">
+            <a:extLst>
+              <a:ext uri="{FF2B5EF4-FFF2-40B4-BE49-F238E27FC236}">
+                <a16:creationId xmlns:a16="http://schemas.microsoft.com/office/drawing/2014/main" id="{A7799869-DEDF-1D6B-D66D-BAF46C8A0F10}"/>
+              </a:ext>
+            </a:extLst>
+          </p:cNvPr>
+          <p:cNvPicPr>
+            <a:picLocks noChangeAspect="1"/>
+          </p:cNvPicPr>
+          <p:nvPr/>
+        </p:nvPicPr>
+        <p:blipFill>
+          <a:blip r:embed="rId2"/>
+          <a:stretch>
+            <a:fillRect/>
+          </a:stretch>
+        </p:blipFill>
+        <p:spPr>
+          <a:xfrm>
+            <a:off x="1100030" y="1280836"/>
+            <a:ext cx="7076932" cy="2649085"/>
+          </a:xfrm>
+          <a:prstGeom prst="rect">
+            <a:avLst/>
+          </a:prstGeom>
+        </p:spPr>
+      </p:pic>
+      <p:sp>
+        <p:nvSpPr>
+          <p:cNvPr id="8" name="Textfeld 7">
+            <a:extLst>
+              <a:ext uri="{FF2B5EF4-FFF2-40B4-BE49-F238E27FC236}">
+                <a16:creationId xmlns:a16="http://schemas.microsoft.com/office/drawing/2014/main" id="{401A6D66-52E8-842F-E9AD-689DB8E04B62}"/>
+              </a:ext>
+            </a:extLst>
+          </p:cNvPr>
+          <p:cNvSpPr txBox="1"/>
+          <p:nvPr/>
+        </p:nvSpPr>
+        <p:spPr>
+          <a:xfrm>
+            <a:off x="721895" y="508764"/>
+            <a:ext cx="2063514" cy="369332"/>
+          </a:xfrm>
+          <a:prstGeom prst="rect">
+            <a:avLst/>
+          </a:prstGeom>
+          <a:noFill/>
+        </p:spPr>
+        <p:txBody>
+          <a:bodyPr wrap="none" rtlCol="0">
+            <a:spAutoFit/>
+          </a:bodyPr>
+          <a:lstStyle/>
+          <a:p>
+            <a:r>
+              <a:rPr lang="de-DE"/>
+              <a:t>Notification content</a:t>
+            </a:r>
+          </a:p>
+        </p:txBody>
+      </p:sp>
+      <p:sp>
+        <p:nvSpPr>
+          <p:cNvPr id="9" name="Textfeld 8">
+            <a:extLst>
+              <a:ext uri="{FF2B5EF4-FFF2-40B4-BE49-F238E27FC236}">
+                <a16:creationId xmlns:a16="http://schemas.microsoft.com/office/drawing/2014/main" id="{B3B157FA-294C-4012-3B0D-7AC6165173E2}"/>
+              </a:ext>
+            </a:extLst>
+          </p:cNvPr>
+          <p:cNvSpPr txBox="1"/>
+          <p:nvPr/>
+        </p:nvSpPr>
+        <p:spPr>
+          <a:xfrm>
+            <a:off x="791792" y="4477040"/>
+            <a:ext cx="7385170" cy="369332"/>
+          </a:xfrm>
+          <a:prstGeom prst="rect">
+            <a:avLst/>
+          </a:prstGeom>
+          <a:noFill/>
+        </p:spPr>
+        <p:txBody>
+          <a:bodyPr wrap="square" rtlCol="0">
+            <a:spAutoFit/>
+          </a:bodyPr>
+          <a:lstStyle/>
+          <a:p>
+            <a:r>
+              <a:rPr lang="de-DE">
+                <a:solidFill>
+                  <a:schemeClr val="accent1">
+                    <a:lumMod val="75000"/>
+                  </a:schemeClr>
+                </a:solidFill>
+              </a:rPr>
+              <a:t>objectIdReference is included in all, but not shown explicitly</a:t>
+            </a:r>
+          </a:p>
+        </p:txBody>
+      </p:sp>
+      <p:sp>
+        <p:nvSpPr>
+          <p:cNvPr id="10" name="Textfeld 9">
+            <a:extLst>
+              <a:ext uri="{FF2B5EF4-FFF2-40B4-BE49-F238E27FC236}">
+                <a16:creationId xmlns:a16="http://schemas.microsoft.com/office/drawing/2014/main" id="{BE225687-1780-E998-93F7-295610E45A7D}"/>
+              </a:ext>
+            </a:extLst>
+          </p:cNvPr>
+          <p:cNvSpPr txBox="1"/>
+          <p:nvPr/>
+        </p:nvSpPr>
+        <p:spPr>
+          <a:xfrm>
+            <a:off x="10562171" y="508764"/>
+            <a:ext cx="787146" cy="369332"/>
+          </a:xfrm>
+          <a:prstGeom prst="rect">
+            <a:avLst/>
+          </a:prstGeom>
+          <a:noFill/>
+        </p:spPr>
+        <p:txBody>
+          <a:bodyPr wrap="square" rtlCol="0">
+            <a:spAutoFit/>
+          </a:bodyPr>
+          <a:lstStyle/>
+          <a:p>
+            <a:r>
+              <a:rPr lang="de-DE">
+                <a:solidFill>
+                  <a:schemeClr val="accent1">
+                    <a:lumMod val="75000"/>
+                  </a:schemeClr>
+                </a:solidFill>
+              </a:rPr>
+              <a:t>TR532</a:t>
+            </a:r>
+          </a:p>
+        </p:txBody>
+      </p:sp>
+    </p:spTree>
+    <p:extLst>
+      <p:ext uri="{BB962C8B-B14F-4D97-AF65-F5344CB8AC3E}">
+        <p14:creationId xmlns:p14="http://schemas.microsoft.com/office/powerpoint/2010/main" val="3163786447"/>
       </p:ext>
     </p:extLst>
   </p:cSld>

</xml_diff>

<commit_message>
[Doc] Update input folder content (#282)
Fixes #281
</commit_message>
<xml_diff>
--- a/spec/input/sketch offered notifications.pptx
+++ b/spec/input/sketch offered notifications.pptx
@@ -8,6 +8,8 @@
     <p:sldId id="256" r:id="rId2"/>
     <p:sldId id="257" r:id="rId3"/>
     <p:sldId id="258" r:id="rId4"/>
+    <p:sldId id="259" r:id="rId5"/>
+    <p:sldId id="260" r:id="rId6"/>
   </p:sldIdLst>
   <p:sldSz cx="12192000" cy="6858000"/>
   <p:notesSz cx="6858000" cy="9144000"/>
@@ -106,6 +108,11 @@
       </a:defRPr>
     </a:lvl9pPr>
   </p:defaultTextStyle>
+  <p:extLst>
+    <p:ext uri="{EFAFB233-063F-42B5-8137-9DF3F51BA10A}">
+      <p15:sldGuideLst xmlns:p15="http://schemas.microsoft.com/office/powerpoint/2012/main"/>
+    </p:ext>
+  </p:extLst>
 </p:presentation>
 </file>
 
@@ -256,7 +263,7 @@
           <a:p>
             <a:fld id="{31AB3599-4C0D-4E00-838F-CBE73BA9A4A9}" type="datetimeFigureOut">
               <a:rPr lang="de-DE" smtClean="0"/>
-              <a:t>12.07.2023</a:t>
+              <a:t>13.07.2023</a:t>
             </a:fld>
             <a:endParaRPr lang="de-DE"/>
           </a:p>
@@ -454,7 +461,7 @@
           <a:p>
             <a:fld id="{31AB3599-4C0D-4E00-838F-CBE73BA9A4A9}" type="datetimeFigureOut">
               <a:rPr lang="de-DE" smtClean="0"/>
-              <a:t>12.07.2023</a:t>
+              <a:t>13.07.2023</a:t>
             </a:fld>
             <a:endParaRPr lang="de-DE"/>
           </a:p>
@@ -662,7 +669,7 @@
           <a:p>
             <a:fld id="{31AB3599-4C0D-4E00-838F-CBE73BA9A4A9}" type="datetimeFigureOut">
               <a:rPr lang="de-DE" smtClean="0"/>
-              <a:t>12.07.2023</a:t>
+              <a:t>13.07.2023</a:t>
             </a:fld>
             <a:endParaRPr lang="de-DE"/>
           </a:p>
@@ -860,7 +867,7 @@
           <a:p>
             <a:fld id="{31AB3599-4C0D-4E00-838F-CBE73BA9A4A9}" type="datetimeFigureOut">
               <a:rPr lang="de-DE" smtClean="0"/>
-              <a:t>12.07.2023</a:t>
+              <a:t>13.07.2023</a:t>
             </a:fld>
             <a:endParaRPr lang="de-DE"/>
           </a:p>
@@ -1135,7 +1142,7 @@
           <a:p>
             <a:fld id="{31AB3599-4C0D-4E00-838F-CBE73BA9A4A9}" type="datetimeFigureOut">
               <a:rPr lang="de-DE" smtClean="0"/>
-              <a:t>12.07.2023</a:t>
+              <a:t>13.07.2023</a:t>
             </a:fld>
             <a:endParaRPr lang="de-DE"/>
           </a:p>
@@ -1400,7 +1407,7 @@
           <a:p>
             <a:fld id="{31AB3599-4C0D-4E00-838F-CBE73BA9A4A9}" type="datetimeFigureOut">
               <a:rPr lang="de-DE" smtClean="0"/>
-              <a:t>12.07.2023</a:t>
+              <a:t>13.07.2023</a:t>
             </a:fld>
             <a:endParaRPr lang="de-DE"/>
           </a:p>
@@ -1812,7 +1819,7 @@
           <a:p>
             <a:fld id="{31AB3599-4C0D-4E00-838F-CBE73BA9A4A9}" type="datetimeFigureOut">
               <a:rPr lang="de-DE" smtClean="0"/>
-              <a:t>12.07.2023</a:t>
+              <a:t>13.07.2023</a:t>
             </a:fld>
             <a:endParaRPr lang="de-DE"/>
           </a:p>
@@ -1953,7 +1960,7 @@
           <a:p>
             <a:fld id="{31AB3599-4C0D-4E00-838F-CBE73BA9A4A9}" type="datetimeFigureOut">
               <a:rPr lang="de-DE" smtClean="0"/>
-              <a:t>12.07.2023</a:t>
+              <a:t>13.07.2023</a:t>
             </a:fld>
             <a:endParaRPr lang="de-DE"/>
           </a:p>
@@ -2066,7 +2073,7 @@
           <a:p>
             <a:fld id="{31AB3599-4C0D-4E00-838F-CBE73BA9A4A9}" type="datetimeFigureOut">
               <a:rPr lang="de-DE" smtClean="0"/>
-              <a:t>12.07.2023</a:t>
+              <a:t>13.07.2023</a:t>
             </a:fld>
             <a:endParaRPr lang="de-DE"/>
           </a:p>
@@ -2377,7 +2384,7 @@
           <a:p>
             <a:fld id="{31AB3599-4C0D-4E00-838F-CBE73BA9A4A9}" type="datetimeFigureOut">
               <a:rPr lang="de-DE" smtClean="0"/>
-              <a:t>12.07.2023</a:t>
+              <a:t>13.07.2023</a:t>
             </a:fld>
             <a:endParaRPr lang="de-DE"/>
           </a:p>
@@ -2665,7 +2672,7 @@
           <a:p>
             <a:fld id="{31AB3599-4C0D-4E00-838F-CBE73BA9A4A9}" type="datetimeFigureOut">
               <a:rPr lang="de-DE" smtClean="0"/>
-              <a:t>12.07.2023</a:t>
+              <a:t>13.07.2023</a:t>
             </a:fld>
             <a:endParaRPr lang="de-DE"/>
           </a:p>
@@ -2906,7 +2913,7 @@
           <a:p>
             <a:fld id="{31AB3599-4C0D-4E00-838F-CBE73BA9A4A9}" type="datetimeFigureOut">
               <a:rPr lang="de-DE" smtClean="0"/>
-              <a:t>12.07.2023</a:t>
+              <a:t>13.07.2023</a:t>
             </a:fld>
             <a:endParaRPr lang="de-DE"/>
           </a:p>
@@ -3496,6 +3503,42 @@
           </a:p>
         </p:txBody>
       </p:sp>
+      <p:sp>
+        <p:nvSpPr>
+          <p:cNvPr id="2" name="Textfeld 1">
+            <a:extLst>
+              <a:ext uri="{FF2B5EF4-FFF2-40B4-BE49-F238E27FC236}">
+                <a16:creationId xmlns:a16="http://schemas.microsoft.com/office/drawing/2014/main" id="{578DB4BD-FCE9-C73D-6712-F6275EC7EC4F}"/>
+              </a:ext>
+            </a:extLst>
+          </p:cNvPr>
+          <p:cNvSpPr txBox="1"/>
+          <p:nvPr/>
+        </p:nvSpPr>
+        <p:spPr>
+          <a:xfrm>
+            <a:off x="3726426" y="1024965"/>
+            <a:ext cx="1894621" cy="369332"/>
+          </a:xfrm>
+          <a:prstGeom prst="rect">
+            <a:avLst/>
+          </a:prstGeom>
+          <a:noFill/>
+        </p:spPr>
+        <p:txBody>
+          <a:bodyPr wrap="none" rtlCol="0">
+            <a:spAutoFit/>
+          </a:bodyPr>
+          <a:lstStyle/>
+          <a:p>
+            <a:r>
+              <a:rPr lang="de-DE"/>
+              <a:t>objectIdReference</a:t>
+            </a:r>
+            <a:endParaRPr lang="de-DE" dirty="0"/>
+          </a:p>
+        </p:txBody>
+      </p:sp>
     </p:spTree>
     <p:extLst>
       <p:ext uri="{BB962C8B-B14F-4D97-AF65-F5344CB8AC3E}">
@@ -3678,8 +3721,8 @@
         </p:nvSpPr>
         <p:spPr>
           <a:xfrm>
-            <a:off x="236014" y="302652"/>
-            <a:ext cx="731290" cy="369332"/>
+            <a:off x="146367" y="0"/>
+            <a:ext cx="3723840" cy="369332"/>
           </a:xfrm>
           <a:prstGeom prst="rect">
             <a:avLst/>
@@ -3693,9 +3736,10 @@
           <a:lstStyle/>
           <a:p>
             <a:r>
-              <a:rPr lang="de-DE" dirty="0"/>
-              <a:t>MNDI</a:t>
-            </a:r>
+              <a:rPr lang="de-DE"/>
+              <a:t>MicroWaveNetworkInventory (MWNI)</a:t>
+            </a:r>
+            <a:endParaRPr lang="de-DE" dirty="0"/>
           </a:p>
         </p:txBody>
       </p:sp>
@@ -4139,6 +4183,11 @@
             <a:avLst/>
           </a:prstGeom>
           <a:ln>
+            <a:solidFill>
+              <a:schemeClr val="accent2">
+                <a:lumMod val="75000"/>
+              </a:schemeClr>
+            </a:solidFill>
             <a:tailEnd type="triangle"/>
           </a:ln>
         </p:spPr>
@@ -4391,7 +4440,7 @@
         <p:spPr>
           <a:xfrm>
             <a:off x="7987447" y="2420465"/>
-            <a:ext cx="3475685" cy="369332"/>
+            <a:ext cx="3475685" cy="646331"/>
           </a:xfrm>
           <a:prstGeom prst="rect">
             <a:avLst/>
@@ -4404,15 +4453,211 @@
           </a:bodyPr>
           <a:lstStyle/>
           <a:p>
+            <a:pPr marL="285750" indent="-285750">
+              <a:buFont typeface="Symbol" panose="05050102010706020507" pitchFamily="18" charset="2"/>
+              <a:buChar char="Þ"/>
+            </a:pPr>
+            <a:r>
+              <a:rPr lang="de-DE"/>
+              <a:t>/</a:t>
+            </a:r>
             <a:r>
               <a:rPr lang="de-DE" dirty="0"/>
-              <a:t>=&gt; /v1/</a:t>
-            </a:r>
-            <a:r>
-              <a:rPr lang="de-DE" dirty="0" err="1"/>
-              <a:t>regard-object-creation</a:t>
-            </a:r>
-            <a:endParaRPr lang="de-DE" dirty="0"/>
+              <a:t>v1</a:t>
+            </a:r>
+            <a:r>
+              <a:rPr lang="de-DE"/>
+              <a:t>/regard-object-creation</a:t>
+            </a:r>
+          </a:p>
+          <a:p>
+            <a:r>
+              <a:rPr lang="de-DE"/>
+              <a:t>      </a:t>
+            </a:r>
+            <a:r>
+              <a:rPr lang="de-DE" sz="1100" i="1"/>
+              <a:t>(answer to)</a:t>
+            </a:r>
+            <a:endParaRPr lang="de-DE" i="1" dirty="0"/>
+          </a:p>
+        </p:txBody>
+      </p:sp>
+      <p:sp>
+        <p:nvSpPr>
+          <p:cNvPr id="2" name="Textfeld 1">
+            <a:extLst>
+              <a:ext uri="{FF2B5EF4-FFF2-40B4-BE49-F238E27FC236}">
+                <a16:creationId xmlns:a16="http://schemas.microsoft.com/office/drawing/2014/main" id="{3C7EF258-068B-87C6-D028-3143EA2A4C3E}"/>
+              </a:ext>
+            </a:extLst>
+          </p:cNvPr>
+          <p:cNvSpPr txBox="1"/>
+          <p:nvPr/>
+        </p:nvSpPr>
+        <p:spPr>
+          <a:xfrm>
+            <a:off x="7894736" y="1469771"/>
+            <a:ext cx="2645276" cy="415498"/>
+          </a:xfrm>
+          <a:prstGeom prst="rect">
+            <a:avLst/>
+          </a:prstGeom>
+          <a:noFill/>
+        </p:spPr>
+        <p:txBody>
+          <a:bodyPr wrap="none" rtlCol="0">
+            <a:spAutoFit/>
+          </a:bodyPr>
+          <a:lstStyle/>
+          <a:p>
+            <a:r>
+              <a:rPr lang="de-DE" sz="1100"/>
+              <a:t>_objIdRef = CC-uuid + mount-name  </a:t>
+            </a:r>
+          </a:p>
+          <a:p>
+            <a:r>
+              <a:rPr lang="de-DE" sz="1000" i="1"/>
+              <a:t>                        (without mount-name not unique)</a:t>
+            </a:r>
+          </a:p>
+        </p:txBody>
+      </p:sp>
+      <p:sp>
+        <p:nvSpPr>
+          <p:cNvPr id="3" name="Textfeld 2">
+            <a:extLst>
+              <a:ext uri="{FF2B5EF4-FFF2-40B4-BE49-F238E27FC236}">
+                <a16:creationId xmlns:a16="http://schemas.microsoft.com/office/drawing/2014/main" id="{2029A431-55B4-AC3E-24A9-CD597295B495}"/>
+              </a:ext>
+            </a:extLst>
+          </p:cNvPr>
+          <p:cNvSpPr txBox="1"/>
+          <p:nvPr/>
+        </p:nvSpPr>
+        <p:spPr>
+          <a:xfrm>
+            <a:off x="8138393" y="13732"/>
+            <a:ext cx="2401619" cy="261610"/>
+          </a:xfrm>
+          <a:prstGeom prst="rect">
+            <a:avLst/>
+          </a:prstGeom>
+          <a:noFill/>
+        </p:spPr>
+        <p:txBody>
+          <a:bodyPr wrap="none" rtlCol="0">
+            <a:spAutoFit/>
+          </a:bodyPr>
+          <a:lstStyle/>
+          <a:p>
+            <a:r>
+              <a:rPr lang="de-DE" sz="1100" b="1">
+                <a:solidFill>
+                  <a:srgbClr val="00B050"/>
+                </a:solidFill>
+              </a:rPr>
+              <a:t>Notification for new ControlConstruct</a:t>
+            </a:r>
+          </a:p>
+        </p:txBody>
+      </p:sp>
+      <p:sp>
+        <p:nvSpPr>
+          <p:cNvPr id="9" name="Scrollen: vertikal 8">
+            <a:extLst>
+              <a:ext uri="{FF2B5EF4-FFF2-40B4-BE49-F238E27FC236}">
+                <a16:creationId xmlns:a16="http://schemas.microsoft.com/office/drawing/2014/main" id="{A1F971F9-603F-8A87-EB97-CAFDA98B0DBE}"/>
+              </a:ext>
+            </a:extLst>
+          </p:cNvPr>
+          <p:cNvSpPr/>
+          <p:nvPr/>
+        </p:nvSpPr>
+        <p:spPr>
+          <a:xfrm>
+            <a:off x="7745147" y="1521246"/>
+            <a:ext cx="186794" cy="161612"/>
+          </a:xfrm>
+          <a:prstGeom prst="verticalScroll">
+            <a:avLst/>
+          </a:prstGeom>
+        </p:spPr>
+        <p:style>
+          <a:lnRef idx="2">
+            <a:schemeClr val="accent4">
+              <a:shade val="50000"/>
+            </a:schemeClr>
+          </a:lnRef>
+          <a:fillRef idx="1">
+            <a:schemeClr val="accent4"/>
+          </a:fillRef>
+          <a:effectRef idx="0">
+            <a:schemeClr val="accent4"/>
+          </a:effectRef>
+          <a:fontRef idx="minor">
+            <a:schemeClr val="lt1"/>
+          </a:fontRef>
+        </p:style>
+        <p:txBody>
+          <a:bodyPr rtlCol="0" anchor="ctr"/>
+          <a:lstStyle/>
+          <a:p>
+            <a:pPr algn="ctr"/>
+            <a:endParaRPr lang="de-DE"/>
+          </a:p>
+        </p:txBody>
+      </p:sp>
+      <p:sp>
+        <p:nvSpPr>
+          <p:cNvPr id="10" name="Rechteck 9">
+            <a:extLst>
+              <a:ext uri="{FF2B5EF4-FFF2-40B4-BE49-F238E27FC236}">
+                <a16:creationId xmlns:a16="http://schemas.microsoft.com/office/drawing/2014/main" id="{9D82CCC2-F8A0-9A91-F077-BD950CBC465D}"/>
+              </a:ext>
+            </a:extLst>
+          </p:cNvPr>
+          <p:cNvSpPr/>
+          <p:nvPr/>
+        </p:nvSpPr>
+        <p:spPr>
+          <a:xfrm>
+            <a:off x="7274608" y="263253"/>
+            <a:ext cx="4301816" cy="1577005"/>
+          </a:xfrm>
+          <a:prstGeom prst="rect">
+            <a:avLst/>
+          </a:prstGeom>
+          <a:noFill/>
+          <a:ln>
+            <a:solidFill>
+              <a:srgbClr val="00B050"/>
+            </a:solidFill>
+          </a:ln>
+        </p:spPr>
+        <p:style>
+          <a:lnRef idx="2">
+            <a:schemeClr val="accent1">
+              <a:shade val="50000"/>
+            </a:schemeClr>
+          </a:lnRef>
+          <a:fillRef idx="1">
+            <a:schemeClr val="accent1"/>
+          </a:fillRef>
+          <a:effectRef idx="0">
+            <a:schemeClr val="accent1"/>
+          </a:effectRef>
+          <a:fontRef idx="minor">
+            <a:schemeClr val="lt1"/>
+          </a:fontRef>
+        </p:style>
+        <p:txBody>
+          <a:bodyPr rtlCol="0" anchor="ctr"/>
+          <a:lstStyle/>
+          <a:p>
+            <a:pPr algn="ctr"/>
+            <a:endParaRPr lang="de-DE"/>
           </a:p>
         </p:txBody>
       </p:sp>
@@ -4469,7 +4714,7 @@
         <p:spPr>
           <a:xfrm>
             <a:off x="5274153" y="890602"/>
-            <a:ext cx="4315427" cy="1848108"/>
+            <a:ext cx="4315427" cy="1820805"/>
           </a:xfrm>
           <a:prstGeom prst="rect">
             <a:avLst/>
@@ -5043,6 +5288,11 @@
             <a:avLst/>
           </a:prstGeom>
           <a:ln>
+            <a:solidFill>
+              <a:schemeClr val="accent2">
+                <a:lumMod val="75000"/>
+              </a:schemeClr>
+            </a:solidFill>
             <a:tailEnd type="triangle"/>
           </a:ln>
         </p:spPr>
@@ -5381,10 +5631,1181 @@
           </a:p>
         </p:txBody>
       </p:sp>
+      <p:sp>
+        <p:nvSpPr>
+          <p:cNvPr id="10" name="Textfeld 9">
+            <a:extLst>
+              <a:ext uri="{FF2B5EF4-FFF2-40B4-BE49-F238E27FC236}">
+                <a16:creationId xmlns:a16="http://schemas.microsoft.com/office/drawing/2014/main" id="{8CB1C4DD-B01D-4B25-B8A9-70B2626028C4}"/>
+              </a:ext>
+            </a:extLst>
+          </p:cNvPr>
+          <p:cNvSpPr txBox="1"/>
+          <p:nvPr/>
+        </p:nvSpPr>
+        <p:spPr>
+          <a:xfrm>
+            <a:off x="6080331" y="2288825"/>
+            <a:ext cx="2942645" cy="261610"/>
+          </a:xfrm>
+          <a:prstGeom prst="rect">
+            <a:avLst/>
+          </a:prstGeom>
+          <a:noFill/>
+        </p:spPr>
+        <p:txBody>
+          <a:bodyPr wrap="square" rtlCol="0">
+            <a:spAutoFit/>
+          </a:bodyPr>
+          <a:lstStyle/>
+          <a:p>
+            <a:r>
+              <a:rPr lang="de-DE" sz="1100"/>
+              <a:t>_objIdRef = &lt;uuid&gt; = mount-name + ltp-uuid</a:t>
+            </a:r>
+            <a:endParaRPr lang="de-DE" sz="1000" i="1"/>
+          </a:p>
+        </p:txBody>
+      </p:sp>
+      <p:sp>
+        <p:nvSpPr>
+          <p:cNvPr id="12" name="Scrollen: vertikal 11">
+            <a:extLst>
+              <a:ext uri="{FF2B5EF4-FFF2-40B4-BE49-F238E27FC236}">
+                <a16:creationId xmlns:a16="http://schemas.microsoft.com/office/drawing/2014/main" id="{A493D264-81A3-32BC-7B3A-7200667FDCDD}"/>
+              </a:ext>
+            </a:extLst>
+          </p:cNvPr>
+          <p:cNvSpPr/>
+          <p:nvPr/>
+        </p:nvSpPr>
+        <p:spPr>
+          <a:xfrm>
+            <a:off x="5840950" y="2340300"/>
+            <a:ext cx="179972" cy="161612"/>
+          </a:xfrm>
+          <a:prstGeom prst="verticalScroll">
+            <a:avLst/>
+          </a:prstGeom>
+        </p:spPr>
+        <p:style>
+          <a:lnRef idx="2">
+            <a:schemeClr val="accent4">
+              <a:shade val="50000"/>
+            </a:schemeClr>
+          </a:lnRef>
+          <a:fillRef idx="1">
+            <a:schemeClr val="accent4"/>
+          </a:fillRef>
+          <a:effectRef idx="0">
+            <a:schemeClr val="accent4"/>
+          </a:effectRef>
+          <a:fontRef idx="minor">
+            <a:schemeClr val="lt1"/>
+          </a:fontRef>
+        </p:style>
+        <p:txBody>
+          <a:bodyPr rtlCol="0" anchor="ctr"/>
+          <a:lstStyle/>
+          <a:p>
+            <a:pPr algn="ctr"/>
+            <a:endParaRPr lang="de-DE"/>
+          </a:p>
+        </p:txBody>
+      </p:sp>
+      <p:sp>
+        <p:nvSpPr>
+          <p:cNvPr id="15" name="Rechteck 14">
+            <a:extLst>
+              <a:ext uri="{FF2B5EF4-FFF2-40B4-BE49-F238E27FC236}">
+                <a16:creationId xmlns:a16="http://schemas.microsoft.com/office/drawing/2014/main" id="{0131B980-109B-7947-BB1D-E696D9CA67AB}"/>
+              </a:ext>
+            </a:extLst>
+          </p:cNvPr>
+          <p:cNvSpPr/>
+          <p:nvPr/>
+        </p:nvSpPr>
+        <p:spPr>
+          <a:xfrm>
+            <a:off x="5520705" y="810559"/>
+            <a:ext cx="4144699" cy="1848754"/>
+          </a:xfrm>
+          <a:prstGeom prst="rect">
+            <a:avLst/>
+          </a:prstGeom>
+          <a:noFill/>
+          <a:ln>
+            <a:solidFill>
+              <a:srgbClr val="00B050"/>
+            </a:solidFill>
+          </a:ln>
+        </p:spPr>
+        <p:style>
+          <a:lnRef idx="2">
+            <a:schemeClr val="accent1">
+              <a:shade val="50000"/>
+            </a:schemeClr>
+          </a:lnRef>
+          <a:fillRef idx="1">
+            <a:schemeClr val="accent1"/>
+          </a:fillRef>
+          <a:effectRef idx="0">
+            <a:schemeClr val="accent1"/>
+          </a:effectRef>
+          <a:fontRef idx="minor">
+            <a:schemeClr val="lt1"/>
+          </a:fontRef>
+        </p:style>
+        <p:txBody>
+          <a:bodyPr rtlCol="0" anchor="ctr"/>
+          <a:lstStyle/>
+          <a:p>
+            <a:pPr algn="ctr"/>
+            <a:endParaRPr lang="de-DE"/>
+          </a:p>
+        </p:txBody>
+      </p:sp>
     </p:spTree>
     <p:extLst>
       <p:ext uri="{BB962C8B-B14F-4D97-AF65-F5344CB8AC3E}">
         <p14:creationId xmlns:p14="http://schemas.microsoft.com/office/powerpoint/2010/main" val="721686558"/>
+      </p:ext>
+    </p:extLst>
+  </p:cSld>
+  <p:clrMapOvr>
+    <a:masterClrMapping/>
+  </p:clrMapOvr>
+</p:sld>
+</file>
+
+<file path=ppt/slides/slide4.xml><?xml version="1.0" encoding="utf-8"?>
+<p:sld xmlns:a="http://schemas.openxmlformats.org/drawingml/2006/main" xmlns:r="http://schemas.openxmlformats.org/officeDocument/2006/relationships" xmlns:p="http://schemas.openxmlformats.org/presentationml/2006/main">
+  <p:cSld>
+    <p:spTree>
+      <p:nvGrpSpPr>
+        <p:cNvPr id="1" name=""/>
+        <p:cNvGrpSpPr/>
+        <p:nvPr/>
+      </p:nvGrpSpPr>
+      <p:grpSpPr>
+        <a:xfrm>
+          <a:off x="0" y="0"/>
+          <a:ext cx="0" cy="0"/>
+          <a:chOff x="0" y="0"/>
+          <a:chExt cx="0" cy="0"/>
+        </a:xfrm>
+      </p:grpSpPr>
+      <p:sp>
+        <p:nvSpPr>
+          <p:cNvPr id="4" name="Rechteck 3">
+            <a:extLst>
+              <a:ext uri="{FF2B5EF4-FFF2-40B4-BE49-F238E27FC236}">
+                <a16:creationId xmlns:a16="http://schemas.microsoft.com/office/drawing/2014/main" id="{41868FAA-F23A-57A1-8B0B-019D5B64C556}"/>
+              </a:ext>
+            </a:extLst>
+          </p:cNvPr>
+          <p:cNvSpPr/>
+          <p:nvPr/>
+        </p:nvSpPr>
+        <p:spPr>
+          <a:xfrm>
+            <a:off x="2422859" y="4491969"/>
+            <a:ext cx="1425678" cy="747251"/>
+          </a:xfrm>
+          <a:prstGeom prst="rect">
+            <a:avLst/>
+          </a:prstGeom>
+        </p:spPr>
+        <p:style>
+          <a:lnRef idx="2">
+            <a:schemeClr val="accent1">
+              <a:shade val="50000"/>
+            </a:schemeClr>
+          </a:lnRef>
+          <a:fillRef idx="1">
+            <a:schemeClr val="accent1"/>
+          </a:fillRef>
+          <a:effectRef idx="0">
+            <a:schemeClr val="accent1"/>
+          </a:effectRef>
+          <a:fontRef idx="minor">
+            <a:schemeClr val="lt1"/>
+          </a:fontRef>
+        </p:style>
+        <p:txBody>
+          <a:bodyPr rtlCol="0" anchor="ctr"/>
+          <a:lstStyle/>
+          <a:p>
+            <a:pPr algn="ctr"/>
+            <a:r>
+              <a:rPr lang="de-DE" dirty="0"/>
+              <a:t>LTP</a:t>
+            </a:r>
+          </a:p>
+        </p:txBody>
+      </p:sp>
+      <p:cxnSp>
+        <p:nvCxnSpPr>
+          <p:cNvPr id="7" name="Gerade Verbindung mit Pfeil 6">
+            <a:extLst>
+              <a:ext uri="{FF2B5EF4-FFF2-40B4-BE49-F238E27FC236}">
+                <a16:creationId xmlns:a16="http://schemas.microsoft.com/office/drawing/2014/main" id="{A5450481-0C8A-386C-3132-0A44D9544E44}"/>
+              </a:ext>
+            </a:extLst>
+          </p:cNvPr>
+          <p:cNvCxnSpPr>
+            <a:cxnSpLocks/>
+            <a:stCxn id="6" idx="2"/>
+            <a:endCxn id="4" idx="0"/>
+          </p:cNvCxnSpPr>
+          <p:nvPr/>
+        </p:nvCxnSpPr>
+        <p:spPr>
+          <a:xfrm flipH="1">
+            <a:off x="3135698" y="3430085"/>
+            <a:ext cx="639097" cy="1061884"/>
+          </a:xfrm>
+          <a:prstGeom prst="straightConnector1">
+            <a:avLst/>
+          </a:prstGeom>
+          <a:ln>
+            <a:tailEnd type="triangle"/>
+          </a:ln>
+        </p:spPr>
+        <p:style>
+          <a:lnRef idx="1">
+            <a:schemeClr val="accent1"/>
+          </a:lnRef>
+          <a:fillRef idx="0">
+            <a:schemeClr val="accent1"/>
+          </a:fillRef>
+          <a:effectRef idx="0">
+            <a:schemeClr val="accent1"/>
+          </a:effectRef>
+          <a:fontRef idx="minor">
+            <a:schemeClr val="tx1"/>
+          </a:fontRef>
+        </p:style>
+      </p:cxnSp>
+      <p:sp>
+        <p:nvSpPr>
+          <p:cNvPr id="6" name="Rechteck 5">
+            <a:extLst>
+              <a:ext uri="{FF2B5EF4-FFF2-40B4-BE49-F238E27FC236}">
+                <a16:creationId xmlns:a16="http://schemas.microsoft.com/office/drawing/2014/main" id="{6BF9408E-4653-AF14-886C-0791AAD5FA4D}"/>
+              </a:ext>
+            </a:extLst>
+          </p:cNvPr>
+          <p:cNvSpPr/>
+          <p:nvPr/>
+        </p:nvSpPr>
+        <p:spPr>
+          <a:xfrm>
+            <a:off x="3061956" y="2682834"/>
+            <a:ext cx="1425678" cy="747251"/>
+          </a:xfrm>
+          <a:prstGeom prst="rect">
+            <a:avLst/>
+          </a:prstGeom>
+        </p:spPr>
+        <p:style>
+          <a:lnRef idx="2">
+            <a:schemeClr val="accent1">
+              <a:shade val="50000"/>
+            </a:schemeClr>
+          </a:lnRef>
+          <a:fillRef idx="1">
+            <a:schemeClr val="accent1"/>
+          </a:fillRef>
+          <a:effectRef idx="0">
+            <a:schemeClr val="accent1"/>
+          </a:effectRef>
+          <a:fontRef idx="minor">
+            <a:schemeClr val="lt1"/>
+          </a:fontRef>
+        </p:style>
+        <p:txBody>
+          <a:bodyPr rtlCol="0" anchor="ctr"/>
+          <a:lstStyle/>
+          <a:p>
+            <a:pPr algn="ctr"/>
+            <a:r>
+              <a:rPr lang="de-DE" dirty="0"/>
+              <a:t>CC</a:t>
+            </a:r>
+          </a:p>
+        </p:txBody>
+      </p:sp>
+      <p:sp>
+        <p:nvSpPr>
+          <p:cNvPr id="11" name="Textfeld 10">
+            <a:extLst>
+              <a:ext uri="{FF2B5EF4-FFF2-40B4-BE49-F238E27FC236}">
+                <a16:creationId xmlns:a16="http://schemas.microsoft.com/office/drawing/2014/main" id="{A1B5B915-7150-3AEC-582B-E266BDDD2F01}"/>
+              </a:ext>
+            </a:extLst>
+          </p:cNvPr>
+          <p:cNvSpPr txBox="1"/>
+          <p:nvPr/>
+        </p:nvSpPr>
+        <p:spPr>
+          <a:xfrm>
+            <a:off x="3305205" y="4177336"/>
+            <a:ext cx="300082" cy="369332"/>
+          </a:xfrm>
+          <a:prstGeom prst="rect">
+            <a:avLst/>
+          </a:prstGeom>
+          <a:noFill/>
+        </p:spPr>
+        <p:txBody>
+          <a:bodyPr wrap="none" rtlCol="0">
+            <a:spAutoFit/>
+          </a:bodyPr>
+          <a:lstStyle/>
+          <a:p>
+            <a:r>
+              <a:rPr lang="de-DE" dirty="0"/>
+              <a:t>*</a:t>
+            </a:r>
+          </a:p>
+        </p:txBody>
+      </p:sp>
+      <p:sp>
+        <p:nvSpPr>
+          <p:cNvPr id="13" name="Rechteck 12">
+            <a:extLst>
+              <a:ext uri="{FF2B5EF4-FFF2-40B4-BE49-F238E27FC236}">
+                <a16:creationId xmlns:a16="http://schemas.microsoft.com/office/drawing/2014/main" id="{298D05AD-5D66-271D-CC5E-89848C4AA757}"/>
+              </a:ext>
+            </a:extLst>
+          </p:cNvPr>
+          <p:cNvSpPr/>
+          <p:nvPr/>
+        </p:nvSpPr>
+        <p:spPr>
+          <a:xfrm>
+            <a:off x="5018575" y="918564"/>
+            <a:ext cx="1425678" cy="747251"/>
+          </a:xfrm>
+          <a:prstGeom prst="rect">
+            <a:avLst/>
+          </a:prstGeom>
+        </p:spPr>
+        <p:style>
+          <a:lnRef idx="2">
+            <a:schemeClr val="accent1">
+              <a:shade val="50000"/>
+            </a:schemeClr>
+          </a:lnRef>
+          <a:fillRef idx="1">
+            <a:schemeClr val="accent1"/>
+          </a:fillRef>
+          <a:effectRef idx="0">
+            <a:schemeClr val="accent1"/>
+          </a:effectRef>
+          <a:fontRef idx="minor">
+            <a:schemeClr val="lt1"/>
+          </a:fontRef>
+        </p:style>
+        <p:txBody>
+          <a:bodyPr rtlCol="0" anchor="ctr"/>
+          <a:lstStyle/>
+          <a:p>
+            <a:pPr algn="ctr"/>
+            <a:r>
+              <a:rPr lang="de-DE" dirty="0"/>
+              <a:t>SDN-Control-Domain</a:t>
+            </a:r>
+          </a:p>
+        </p:txBody>
+      </p:sp>
+      <p:cxnSp>
+        <p:nvCxnSpPr>
+          <p:cNvPr id="14" name="Gerade Verbindung mit Pfeil 13">
+            <a:extLst>
+              <a:ext uri="{FF2B5EF4-FFF2-40B4-BE49-F238E27FC236}">
+                <a16:creationId xmlns:a16="http://schemas.microsoft.com/office/drawing/2014/main" id="{3B29907C-9D6C-2190-0312-2E578383A75E}"/>
+              </a:ext>
+            </a:extLst>
+          </p:cNvPr>
+          <p:cNvCxnSpPr>
+            <a:cxnSpLocks/>
+            <a:stCxn id="13" idx="2"/>
+            <a:endCxn id="6" idx="0"/>
+          </p:cNvCxnSpPr>
+          <p:nvPr/>
+        </p:nvCxnSpPr>
+        <p:spPr>
+          <a:xfrm flipH="1">
+            <a:off x="3774795" y="1665815"/>
+            <a:ext cx="1956619" cy="1017019"/>
+          </a:xfrm>
+          <a:prstGeom prst="straightConnector1">
+            <a:avLst/>
+          </a:prstGeom>
+          <a:ln>
+            <a:tailEnd type="triangle"/>
+          </a:ln>
+        </p:spPr>
+        <p:style>
+          <a:lnRef idx="1">
+            <a:schemeClr val="accent1"/>
+          </a:lnRef>
+          <a:fillRef idx="0">
+            <a:schemeClr val="accent1"/>
+          </a:fillRef>
+          <a:effectRef idx="0">
+            <a:schemeClr val="accent1"/>
+          </a:effectRef>
+          <a:fontRef idx="minor">
+            <a:schemeClr val="tx1"/>
+          </a:fontRef>
+        </p:style>
+      </p:cxnSp>
+      <p:sp>
+        <p:nvSpPr>
+          <p:cNvPr id="18" name="Textfeld 17">
+            <a:extLst>
+              <a:ext uri="{FF2B5EF4-FFF2-40B4-BE49-F238E27FC236}">
+                <a16:creationId xmlns:a16="http://schemas.microsoft.com/office/drawing/2014/main" id="{AEF99DD7-23F8-80C2-1E8C-C44068F22E2D}"/>
+              </a:ext>
+            </a:extLst>
+          </p:cNvPr>
+          <p:cNvSpPr txBox="1"/>
+          <p:nvPr/>
+        </p:nvSpPr>
+        <p:spPr>
+          <a:xfrm>
+            <a:off x="4072121" y="2427194"/>
+            <a:ext cx="300082" cy="369332"/>
+          </a:xfrm>
+          <a:prstGeom prst="rect">
+            <a:avLst/>
+          </a:prstGeom>
+          <a:noFill/>
+        </p:spPr>
+        <p:txBody>
+          <a:bodyPr wrap="none" rtlCol="0">
+            <a:spAutoFit/>
+          </a:bodyPr>
+          <a:lstStyle/>
+          <a:p>
+            <a:r>
+              <a:rPr lang="de-DE" dirty="0"/>
+              <a:t>*</a:t>
+            </a:r>
+          </a:p>
+        </p:txBody>
+      </p:sp>
+      <p:cxnSp>
+        <p:nvCxnSpPr>
+          <p:cNvPr id="19" name="Gerade Verbindung mit Pfeil 18">
+            <a:extLst>
+              <a:ext uri="{FF2B5EF4-FFF2-40B4-BE49-F238E27FC236}">
+                <a16:creationId xmlns:a16="http://schemas.microsoft.com/office/drawing/2014/main" id="{8C6DAD84-5E8B-E07C-4782-07DCC0681DF7}"/>
+              </a:ext>
+            </a:extLst>
+          </p:cNvPr>
+          <p:cNvCxnSpPr>
+            <a:cxnSpLocks/>
+            <a:stCxn id="13" idx="2"/>
+            <a:endCxn id="23" idx="0"/>
+          </p:cNvCxnSpPr>
+          <p:nvPr/>
+        </p:nvCxnSpPr>
+        <p:spPr>
+          <a:xfrm>
+            <a:off x="5731414" y="1665815"/>
+            <a:ext cx="1425678" cy="1820805"/>
+          </a:xfrm>
+          <a:prstGeom prst="straightConnector1">
+            <a:avLst/>
+          </a:prstGeom>
+          <a:ln>
+            <a:tailEnd type="triangle"/>
+          </a:ln>
+        </p:spPr>
+        <p:style>
+          <a:lnRef idx="1">
+            <a:schemeClr val="accent1"/>
+          </a:lnRef>
+          <a:fillRef idx="0">
+            <a:schemeClr val="accent1"/>
+          </a:fillRef>
+          <a:effectRef idx="0">
+            <a:schemeClr val="accent1"/>
+          </a:effectRef>
+          <a:fontRef idx="minor">
+            <a:schemeClr val="tx1"/>
+          </a:fontRef>
+        </p:style>
+      </p:cxnSp>
+      <p:sp>
+        <p:nvSpPr>
+          <p:cNvPr id="23" name="Rechteck 22">
+            <a:extLst>
+              <a:ext uri="{FF2B5EF4-FFF2-40B4-BE49-F238E27FC236}">
+                <a16:creationId xmlns:a16="http://schemas.microsoft.com/office/drawing/2014/main" id="{0657224B-3501-0B57-9FF9-AF3D4B8F760D}"/>
+              </a:ext>
+            </a:extLst>
+          </p:cNvPr>
+          <p:cNvSpPr/>
+          <p:nvPr/>
+        </p:nvSpPr>
+        <p:spPr>
+          <a:xfrm>
+            <a:off x="6444253" y="3486620"/>
+            <a:ext cx="1425678" cy="747251"/>
+          </a:xfrm>
+          <a:prstGeom prst="rect">
+            <a:avLst/>
+          </a:prstGeom>
+        </p:spPr>
+        <p:style>
+          <a:lnRef idx="2">
+            <a:schemeClr val="accent1">
+              <a:shade val="50000"/>
+            </a:schemeClr>
+          </a:lnRef>
+          <a:fillRef idx="1">
+            <a:schemeClr val="accent1"/>
+          </a:fillRef>
+          <a:effectRef idx="0">
+            <a:schemeClr val="accent1"/>
+          </a:effectRef>
+          <a:fontRef idx="minor">
+            <a:schemeClr val="lt1"/>
+          </a:fontRef>
+        </p:style>
+        <p:txBody>
+          <a:bodyPr rtlCol="0" anchor="ctr"/>
+          <a:lstStyle/>
+          <a:p>
+            <a:pPr algn="ctr"/>
+            <a:r>
+              <a:rPr lang="de-DE" dirty="0"/>
+              <a:t>Links</a:t>
+            </a:r>
+          </a:p>
+        </p:txBody>
+      </p:sp>
+      <p:sp>
+        <p:nvSpPr>
+          <p:cNvPr id="27" name="Textfeld 26">
+            <a:extLst>
+              <a:ext uri="{FF2B5EF4-FFF2-40B4-BE49-F238E27FC236}">
+                <a16:creationId xmlns:a16="http://schemas.microsoft.com/office/drawing/2014/main" id="{07946B62-0E9F-18AA-5A63-857B39824E5B}"/>
+              </a:ext>
+            </a:extLst>
+          </p:cNvPr>
+          <p:cNvSpPr txBox="1"/>
+          <p:nvPr/>
+        </p:nvSpPr>
+        <p:spPr>
+          <a:xfrm>
+            <a:off x="7157092" y="3198406"/>
+            <a:ext cx="300082" cy="369332"/>
+          </a:xfrm>
+          <a:prstGeom prst="rect">
+            <a:avLst/>
+          </a:prstGeom>
+          <a:noFill/>
+        </p:spPr>
+        <p:txBody>
+          <a:bodyPr wrap="none" rtlCol="0">
+            <a:spAutoFit/>
+          </a:bodyPr>
+          <a:lstStyle/>
+          <a:p>
+            <a:r>
+              <a:rPr lang="de-DE" dirty="0"/>
+              <a:t>*</a:t>
+            </a:r>
+          </a:p>
+        </p:txBody>
+      </p:sp>
+      <p:cxnSp>
+        <p:nvCxnSpPr>
+          <p:cNvPr id="28" name="Gerade Verbindung mit Pfeil 27">
+            <a:extLst>
+              <a:ext uri="{FF2B5EF4-FFF2-40B4-BE49-F238E27FC236}">
+                <a16:creationId xmlns:a16="http://schemas.microsoft.com/office/drawing/2014/main" id="{3C89BA06-860E-ACC3-F1A2-1A55245B65A0}"/>
+              </a:ext>
+            </a:extLst>
+          </p:cNvPr>
+          <p:cNvCxnSpPr>
+            <a:cxnSpLocks/>
+            <a:stCxn id="23" idx="2"/>
+            <a:endCxn id="4" idx="3"/>
+          </p:cNvCxnSpPr>
+          <p:nvPr/>
+        </p:nvCxnSpPr>
+        <p:spPr>
+          <a:xfrm flipH="1">
+            <a:off x="3848537" y="4233871"/>
+            <a:ext cx="3308555" cy="631724"/>
+          </a:xfrm>
+          <a:prstGeom prst="straightConnector1">
+            <a:avLst/>
+          </a:prstGeom>
+          <a:ln>
+            <a:tailEnd type="triangle"/>
+          </a:ln>
+        </p:spPr>
+        <p:style>
+          <a:lnRef idx="1">
+            <a:schemeClr val="accent1"/>
+          </a:lnRef>
+          <a:fillRef idx="0">
+            <a:schemeClr val="accent1"/>
+          </a:fillRef>
+          <a:effectRef idx="0">
+            <a:schemeClr val="accent1"/>
+          </a:effectRef>
+          <a:fontRef idx="minor">
+            <a:schemeClr val="tx1"/>
+          </a:fontRef>
+        </p:style>
+      </p:cxnSp>
+      <p:sp>
+        <p:nvSpPr>
+          <p:cNvPr id="34" name="Textfeld 33">
+            <a:extLst>
+              <a:ext uri="{FF2B5EF4-FFF2-40B4-BE49-F238E27FC236}">
+                <a16:creationId xmlns:a16="http://schemas.microsoft.com/office/drawing/2014/main" id="{85A675B9-B9C4-5831-0D07-0E5E2E853FE8}"/>
+              </a:ext>
+            </a:extLst>
+          </p:cNvPr>
+          <p:cNvSpPr txBox="1"/>
+          <p:nvPr/>
+        </p:nvSpPr>
+        <p:spPr>
+          <a:xfrm>
+            <a:off x="3904874" y="4869888"/>
+            <a:ext cx="300082" cy="369332"/>
+          </a:xfrm>
+          <a:prstGeom prst="rect">
+            <a:avLst/>
+          </a:prstGeom>
+          <a:noFill/>
+        </p:spPr>
+        <p:txBody>
+          <a:bodyPr wrap="none" rtlCol="0">
+            <a:spAutoFit/>
+          </a:bodyPr>
+          <a:lstStyle/>
+          <a:p>
+            <a:r>
+              <a:rPr lang="de-DE" dirty="0"/>
+              <a:t>*</a:t>
+            </a:r>
+          </a:p>
+        </p:txBody>
+      </p:sp>
+      <p:pic>
+        <p:nvPicPr>
+          <p:cNvPr id="3" name="Grafik 2">
+            <a:extLst>
+              <a:ext uri="{FF2B5EF4-FFF2-40B4-BE49-F238E27FC236}">
+                <a16:creationId xmlns:a16="http://schemas.microsoft.com/office/drawing/2014/main" id="{E4B0D0D8-93DB-6440-606E-6754C2D929EF}"/>
+              </a:ext>
+            </a:extLst>
+          </p:cNvPr>
+          <p:cNvPicPr>
+            <a:picLocks noChangeAspect="1"/>
+          </p:cNvPicPr>
+          <p:nvPr/>
+        </p:nvPicPr>
+        <p:blipFill>
+          <a:blip r:embed="rId2"/>
+          <a:stretch>
+            <a:fillRect/>
+          </a:stretch>
+        </p:blipFill>
+        <p:spPr>
+          <a:xfrm>
+            <a:off x="100315" y="666298"/>
+            <a:ext cx="4200525" cy="1771650"/>
+          </a:xfrm>
+          <a:prstGeom prst="rect">
+            <a:avLst/>
+          </a:prstGeom>
+        </p:spPr>
+      </p:pic>
+      <p:cxnSp>
+        <p:nvCxnSpPr>
+          <p:cNvPr id="10" name="Gerade Verbindung mit Pfeil 9">
+            <a:extLst>
+              <a:ext uri="{FF2B5EF4-FFF2-40B4-BE49-F238E27FC236}">
+                <a16:creationId xmlns:a16="http://schemas.microsoft.com/office/drawing/2014/main" id="{C34382BF-FB60-7E68-5572-6C0952CCB3F1}"/>
+              </a:ext>
+            </a:extLst>
+          </p:cNvPr>
+          <p:cNvCxnSpPr/>
+          <p:nvPr/>
+        </p:nvCxnSpPr>
+        <p:spPr>
+          <a:xfrm flipV="1">
+            <a:off x="3412375" y="1208303"/>
+            <a:ext cx="1490769" cy="148105"/>
+          </a:xfrm>
+          <a:prstGeom prst="straightConnector1">
+            <a:avLst/>
+          </a:prstGeom>
+          <a:ln>
+            <a:tailEnd type="triangle"/>
+          </a:ln>
+        </p:spPr>
+        <p:style>
+          <a:lnRef idx="1">
+            <a:schemeClr val="accent4"/>
+          </a:lnRef>
+          <a:fillRef idx="0">
+            <a:schemeClr val="accent4"/>
+          </a:fillRef>
+          <a:effectRef idx="0">
+            <a:schemeClr val="accent4"/>
+          </a:effectRef>
+          <a:fontRef idx="minor">
+            <a:schemeClr val="tx1"/>
+          </a:fontRef>
+        </p:style>
+      </p:cxnSp>
+      <p:cxnSp>
+        <p:nvCxnSpPr>
+          <p:cNvPr id="15" name="Gerade Verbindung mit Pfeil 14">
+            <a:extLst>
+              <a:ext uri="{FF2B5EF4-FFF2-40B4-BE49-F238E27FC236}">
+                <a16:creationId xmlns:a16="http://schemas.microsoft.com/office/drawing/2014/main" id="{79BEA6E0-737A-9071-C0B0-D5F763B37C63}"/>
+              </a:ext>
+            </a:extLst>
+          </p:cNvPr>
+          <p:cNvCxnSpPr/>
+          <p:nvPr/>
+        </p:nvCxnSpPr>
+        <p:spPr>
+          <a:xfrm>
+            <a:off x="1383431" y="1569495"/>
+            <a:ext cx="3233833" cy="661204"/>
+          </a:xfrm>
+          <a:prstGeom prst="straightConnector1">
+            <a:avLst/>
+          </a:prstGeom>
+          <a:ln>
+            <a:tailEnd type="triangle"/>
+          </a:ln>
+        </p:spPr>
+        <p:style>
+          <a:lnRef idx="1">
+            <a:schemeClr val="accent4"/>
+          </a:lnRef>
+          <a:fillRef idx="0">
+            <a:schemeClr val="accent4"/>
+          </a:fillRef>
+          <a:effectRef idx="0">
+            <a:schemeClr val="accent4"/>
+          </a:effectRef>
+          <a:fontRef idx="minor">
+            <a:schemeClr val="tx1"/>
+          </a:fontRef>
+        </p:style>
+      </p:cxnSp>
+      <p:sp>
+        <p:nvSpPr>
+          <p:cNvPr id="17" name="Textfeld 16">
+            <a:extLst>
+              <a:ext uri="{FF2B5EF4-FFF2-40B4-BE49-F238E27FC236}">
+                <a16:creationId xmlns:a16="http://schemas.microsoft.com/office/drawing/2014/main" id="{512BBF6E-7B9C-A649-B6CD-0EFA62E1FF4A}"/>
+              </a:ext>
+            </a:extLst>
+          </p:cNvPr>
+          <p:cNvSpPr txBox="1"/>
+          <p:nvPr/>
+        </p:nvSpPr>
+        <p:spPr>
+          <a:xfrm>
+            <a:off x="0" y="101173"/>
+            <a:ext cx="11765291" cy="276999"/>
+          </a:xfrm>
+          <a:prstGeom prst="rect">
+            <a:avLst/>
+          </a:prstGeom>
+          <a:noFill/>
+        </p:spPr>
+        <p:txBody>
+          <a:bodyPr wrap="square">
+            <a:spAutoFit/>
+          </a:bodyPr>
+          <a:lstStyle/>
+          <a:p>
+            <a:r>
+              <a:rPr lang="de-DE" sz="1200" b="0" i="0">
+                <a:solidFill>
+                  <a:srgbClr val="212121"/>
+                </a:solidFill>
+                <a:effectLst/>
+                <a:latin typeface="Inter"/>
+              </a:rPr>
+              <a:t>http://&lt;ctrlIP&gt;:8181/rests/data/network-topology:network-topology/topology=topology-netconf</a:t>
+            </a:r>
+            <a:endParaRPr lang="de-DE" sz="1200"/>
+          </a:p>
+        </p:txBody>
+      </p:sp>
+      <p:sp>
+        <p:nvSpPr>
+          <p:cNvPr id="21" name="Textfeld 20">
+            <a:extLst>
+              <a:ext uri="{FF2B5EF4-FFF2-40B4-BE49-F238E27FC236}">
+                <a16:creationId xmlns:a16="http://schemas.microsoft.com/office/drawing/2014/main" id="{95FBE992-6C34-7626-6AA2-D3BF694C9596}"/>
+              </a:ext>
+            </a:extLst>
+          </p:cNvPr>
+          <p:cNvSpPr txBox="1"/>
+          <p:nvPr/>
+        </p:nvSpPr>
+        <p:spPr>
+          <a:xfrm>
+            <a:off x="4960418" y="567131"/>
+            <a:ext cx="1601208" cy="369332"/>
+          </a:xfrm>
+          <a:prstGeom prst="rect">
+            <a:avLst/>
+          </a:prstGeom>
+          <a:noFill/>
+        </p:spPr>
+        <p:txBody>
+          <a:bodyPr wrap="none" rtlCol="0">
+            <a:spAutoFit/>
+          </a:bodyPr>
+          <a:lstStyle/>
+          <a:p>
+            <a:r>
+              <a:rPr lang="de-DE">
+                <a:solidFill>
+                  <a:srgbClr val="7030A0"/>
+                </a:solidFill>
+              </a:rPr>
+              <a:t>MWDI path „/“</a:t>
+            </a:r>
+          </a:p>
+        </p:txBody>
+      </p:sp>
+      <p:sp>
+        <p:nvSpPr>
+          <p:cNvPr id="2" name="Textfeld 1">
+            <a:extLst>
+              <a:ext uri="{FF2B5EF4-FFF2-40B4-BE49-F238E27FC236}">
+                <a16:creationId xmlns:a16="http://schemas.microsoft.com/office/drawing/2014/main" id="{BE97255D-6F9E-7CBD-10AB-C4219DC8B744}"/>
+              </a:ext>
+            </a:extLst>
+          </p:cNvPr>
+          <p:cNvSpPr txBox="1"/>
+          <p:nvPr/>
+        </p:nvSpPr>
+        <p:spPr>
+          <a:xfrm>
+            <a:off x="7457174" y="666298"/>
+            <a:ext cx="4262621" cy="1600438"/>
+          </a:xfrm>
+          <a:prstGeom prst="rect">
+            <a:avLst/>
+          </a:prstGeom>
+          <a:noFill/>
+          <a:ln>
+            <a:solidFill>
+              <a:srgbClr val="0070C0"/>
+            </a:solidFill>
+          </a:ln>
+        </p:spPr>
+        <p:txBody>
+          <a:bodyPr wrap="square" rtlCol="0">
+            <a:spAutoFit/>
+          </a:bodyPr>
+          <a:lstStyle/>
+          <a:p>
+            <a:r>
+              <a:rPr lang="de-DE" sz="1400" b="1">
+                <a:solidFill>
+                  <a:schemeClr val="accent1">
+                    <a:lumMod val="75000"/>
+                  </a:schemeClr>
+                </a:solidFill>
+              </a:rPr>
+              <a:t>MWNI</a:t>
+            </a:r>
+            <a:r>
+              <a:rPr lang="de-DE" sz="1400">
+                <a:solidFill>
+                  <a:schemeClr val="accent1">
+                    <a:lumMod val="75000"/>
+                  </a:schemeClr>
+                </a:solidFill>
+              </a:rPr>
+              <a:t> will provide two elements on topology-netconf level:</a:t>
+            </a:r>
+          </a:p>
+          <a:p>
+            <a:pPr marL="285750" indent="-285750">
+              <a:buFontTx/>
+              <a:buChar char="-"/>
+            </a:pPr>
+            <a:r>
+              <a:rPr lang="de-DE" sz="1400" b="1">
+                <a:solidFill>
+                  <a:schemeClr val="accent1">
+                    <a:lumMod val="75000"/>
+                  </a:schemeClr>
+                </a:solidFill>
+              </a:rPr>
+              <a:t>node list </a:t>
+            </a:r>
+            <a:r>
+              <a:rPr lang="de-DE" sz="1400">
+                <a:solidFill>
+                  <a:schemeClr val="accent1">
+                    <a:lumMod val="75000"/>
+                  </a:schemeClr>
+                </a:solidFill>
+              </a:rPr>
+              <a:t>(also in Controller)</a:t>
+            </a:r>
+          </a:p>
+          <a:p>
+            <a:pPr marL="285750" indent="-285750">
+              <a:buFontTx/>
+              <a:buChar char="-"/>
+            </a:pPr>
+            <a:r>
+              <a:rPr lang="de-DE" sz="1400" b="1">
+                <a:solidFill>
+                  <a:schemeClr val="accent1">
+                    <a:lumMod val="75000"/>
+                  </a:schemeClr>
+                </a:solidFill>
+              </a:rPr>
+              <a:t>link list </a:t>
+            </a:r>
+            <a:r>
+              <a:rPr lang="de-DE" sz="1400">
+                <a:solidFill>
+                  <a:schemeClr val="accent1">
+                    <a:lumMod val="75000"/>
+                  </a:schemeClr>
+                </a:solidFill>
+              </a:rPr>
+              <a:t>(NOT in Controller, just in App)</a:t>
+            </a:r>
+          </a:p>
+          <a:p>
+            <a:pPr marL="285750" indent="-285750">
+              <a:buFontTx/>
+              <a:buChar char="-"/>
+            </a:pPr>
+            <a:endParaRPr lang="de-DE" sz="1400">
+              <a:solidFill>
+                <a:schemeClr val="accent1">
+                  <a:lumMod val="75000"/>
+                </a:schemeClr>
+              </a:solidFill>
+            </a:endParaRPr>
+          </a:p>
+          <a:p>
+            <a:r>
+              <a:rPr lang="de-DE" sz="1400">
+                <a:solidFill>
+                  <a:schemeClr val="accent1">
+                    <a:lumMod val="75000"/>
+                  </a:schemeClr>
+                </a:solidFill>
+              </a:rPr>
+              <a:t>Link list: each link contains shared-associations between LTPs under the ControlConstructs</a:t>
+            </a:r>
+          </a:p>
+        </p:txBody>
+      </p:sp>
+    </p:spTree>
+    <p:extLst>
+      <p:ext uri="{BB962C8B-B14F-4D97-AF65-F5344CB8AC3E}">
+        <p14:creationId xmlns:p14="http://schemas.microsoft.com/office/powerpoint/2010/main" val="40976844"/>
+      </p:ext>
+    </p:extLst>
+  </p:cSld>
+  <p:clrMapOvr>
+    <a:masterClrMapping/>
+  </p:clrMapOvr>
+</p:sld>
+</file>
+
+<file path=ppt/slides/slide5.xml><?xml version="1.0" encoding="utf-8"?>
+<p:sld xmlns:a="http://schemas.openxmlformats.org/drawingml/2006/main" xmlns:r="http://schemas.openxmlformats.org/officeDocument/2006/relationships" xmlns:p="http://schemas.openxmlformats.org/presentationml/2006/main">
+  <p:cSld>
+    <p:spTree>
+      <p:nvGrpSpPr>
+        <p:cNvPr id="1" name=""/>
+        <p:cNvGrpSpPr/>
+        <p:nvPr/>
+      </p:nvGrpSpPr>
+      <p:grpSpPr>
+        <a:xfrm>
+          <a:off x="0" y="0"/>
+          <a:ext cx="0" cy="0"/>
+          <a:chOff x="0" y="0"/>
+          <a:chExt cx="0" cy="0"/>
+        </a:xfrm>
+      </p:grpSpPr>
+      <p:pic>
+        <p:nvPicPr>
+          <p:cNvPr id="7" name="Grafik 6">
+            <a:extLst>
+              <a:ext uri="{FF2B5EF4-FFF2-40B4-BE49-F238E27FC236}">
+                <a16:creationId xmlns:a16="http://schemas.microsoft.com/office/drawing/2014/main" id="{A7799869-DEDF-1D6B-D66D-BAF46C8A0F10}"/>
+              </a:ext>
+            </a:extLst>
+          </p:cNvPr>
+          <p:cNvPicPr>
+            <a:picLocks noChangeAspect="1"/>
+          </p:cNvPicPr>
+          <p:nvPr/>
+        </p:nvPicPr>
+        <p:blipFill>
+          <a:blip r:embed="rId2"/>
+          <a:stretch>
+            <a:fillRect/>
+          </a:stretch>
+        </p:blipFill>
+        <p:spPr>
+          <a:xfrm>
+            <a:off x="1100030" y="1280836"/>
+            <a:ext cx="7076932" cy="2649085"/>
+          </a:xfrm>
+          <a:prstGeom prst="rect">
+            <a:avLst/>
+          </a:prstGeom>
+        </p:spPr>
+      </p:pic>
+      <p:sp>
+        <p:nvSpPr>
+          <p:cNvPr id="8" name="Textfeld 7">
+            <a:extLst>
+              <a:ext uri="{FF2B5EF4-FFF2-40B4-BE49-F238E27FC236}">
+                <a16:creationId xmlns:a16="http://schemas.microsoft.com/office/drawing/2014/main" id="{401A6D66-52E8-842F-E9AD-689DB8E04B62}"/>
+              </a:ext>
+            </a:extLst>
+          </p:cNvPr>
+          <p:cNvSpPr txBox="1"/>
+          <p:nvPr/>
+        </p:nvSpPr>
+        <p:spPr>
+          <a:xfrm>
+            <a:off x="721895" y="508764"/>
+            <a:ext cx="2063514" cy="369332"/>
+          </a:xfrm>
+          <a:prstGeom prst="rect">
+            <a:avLst/>
+          </a:prstGeom>
+          <a:noFill/>
+        </p:spPr>
+        <p:txBody>
+          <a:bodyPr wrap="none" rtlCol="0">
+            <a:spAutoFit/>
+          </a:bodyPr>
+          <a:lstStyle/>
+          <a:p>
+            <a:r>
+              <a:rPr lang="de-DE"/>
+              <a:t>Notification content</a:t>
+            </a:r>
+          </a:p>
+        </p:txBody>
+      </p:sp>
+      <p:sp>
+        <p:nvSpPr>
+          <p:cNvPr id="9" name="Textfeld 8">
+            <a:extLst>
+              <a:ext uri="{FF2B5EF4-FFF2-40B4-BE49-F238E27FC236}">
+                <a16:creationId xmlns:a16="http://schemas.microsoft.com/office/drawing/2014/main" id="{B3B157FA-294C-4012-3B0D-7AC6165173E2}"/>
+              </a:ext>
+            </a:extLst>
+          </p:cNvPr>
+          <p:cNvSpPr txBox="1"/>
+          <p:nvPr/>
+        </p:nvSpPr>
+        <p:spPr>
+          <a:xfrm>
+            <a:off x="791792" y="4477040"/>
+            <a:ext cx="7385170" cy="369332"/>
+          </a:xfrm>
+          <a:prstGeom prst="rect">
+            <a:avLst/>
+          </a:prstGeom>
+          <a:noFill/>
+        </p:spPr>
+        <p:txBody>
+          <a:bodyPr wrap="square" rtlCol="0">
+            <a:spAutoFit/>
+          </a:bodyPr>
+          <a:lstStyle/>
+          <a:p>
+            <a:r>
+              <a:rPr lang="de-DE">
+                <a:solidFill>
+                  <a:schemeClr val="accent1">
+                    <a:lumMod val="75000"/>
+                  </a:schemeClr>
+                </a:solidFill>
+              </a:rPr>
+              <a:t>objectIdReference is included in all, but not shown explicitly</a:t>
+            </a:r>
+          </a:p>
+        </p:txBody>
+      </p:sp>
+      <p:sp>
+        <p:nvSpPr>
+          <p:cNvPr id="10" name="Textfeld 9">
+            <a:extLst>
+              <a:ext uri="{FF2B5EF4-FFF2-40B4-BE49-F238E27FC236}">
+                <a16:creationId xmlns:a16="http://schemas.microsoft.com/office/drawing/2014/main" id="{BE225687-1780-E998-93F7-295610E45A7D}"/>
+              </a:ext>
+            </a:extLst>
+          </p:cNvPr>
+          <p:cNvSpPr txBox="1"/>
+          <p:nvPr/>
+        </p:nvSpPr>
+        <p:spPr>
+          <a:xfrm>
+            <a:off x="10562171" y="508764"/>
+            <a:ext cx="787146" cy="369332"/>
+          </a:xfrm>
+          <a:prstGeom prst="rect">
+            <a:avLst/>
+          </a:prstGeom>
+          <a:noFill/>
+        </p:spPr>
+        <p:txBody>
+          <a:bodyPr wrap="square" rtlCol="0">
+            <a:spAutoFit/>
+          </a:bodyPr>
+          <a:lstStyle/>
+          <a:p>
+            <a:r>
+              <a:rPr lang="de-DE">
+                <a:solidFill>
+                  <a:schemeClr val="accent1">
+                    <a:lumMod val="75000"/>
+                  </a:schemeClr>
+                </a:solidFill>
+              </a:rPr>
+              <a:t>TR532</a:t>
+            </a:r>
+          </a:p>
+        </p:txBody>
+      </p:sp>
+    </p:spTree>
+    <p:extLst>
+      <p:ext uri="{BB962C8B-B14F-4D97-AF65-F5344CB8AC3E}">
+        <p14:creationId xmlns:p14="http://schemas.microsoft.com/office/powerpoint/2010/main" val="3163786447"/>
       </p:ext>
     </p:extLst>
   </p:cSld>

</xml_diff>